<commit_message>
added new steps, updated docs
</commit_message>
<xml_diff>
--- a/docs/ansible-slides.pptx
+++ b/docs/ansible-slides.pptx
@@ -25,6 +25,7 @@
     <p:sldId id="272" r:id="rId20"/>
     <p:sldId id="273" r:id="rId21"/>
     <p:sldId id="274" r:id="rId22"/>
+    <p:sldId id="275" r:id="rId23"/>
   </p:sldIdLst>
   <p:sldSz cx="10080625" cy="5670550"/>
   <p:notesSz cx="7559675" cy="10691812"/>
@@ -3391,7 +3392,7 @@
           </a:bodyPr>
           <a:p>
             <a:pPr algn="r"/>
-            <a:fld id="{48FAAA11-1FCA-43C7-AED7-3CCE6B9C4E49}" type="slidenum">
+            <a:fld id="{95DB50DA-EC3A-4735-9B2D-04E26050B72A}" type="slidenum">
               <a:rPr b="0" lang="en-US" sz="1400" spc="-1" strike="noStrike">
                 <a:solidFill>
                   <a:srgbClr val="ffffff"/>
@@ -3902,7 +3903,7 @@
           </a:bodyPr>
           <a:p>
             <a:pPr algn="r"/>
-            <a:fld id="{8996471D-2120-4D71-8DF8-86E2399C42B5}" type="slidenum">
+            <a:fld id="{1516F4B2-33FA-471B-95BF-48CD238F8F1A}" type="slidenum">
               <a:rPr b="0" lang="en-US" sz="1400" spc="-1" strike="noStrike">
                 <a:solidFill>
                   <a:srgbClr val="ffffff"/>
@@ -4115,7 +4116,7 @@
                 </a:solidFill>
                 <a:latin typeface="Arial"/>
               </a:rPr>
-              <a:t>Files</a:t>
+              <a:t>Defaults</a:t>
             </a:r>
             <a:endParaRPr b="0" lang="en-US" sz="2400" spc="-1" strike="noStrike">
               <a:solidFill>
@@ -4143,7 +4144,7 @@
                 </a:solidFill>
                 <a:latin typeface="Arial"/>
               </a:rPr>
-              <a:t>Store files for this specific role</a:t>
+              <a:t>Contains default values for variables</a:t>
             </a:r>
             <a:endParaRPr b="0" lang="en-US" sz="2100" spc="-1" strike="noStrike">
               <a:solidFill>
@@ -4171,7 +4172,35 @@
                 </a:solidFill>
                 <a:latin typeface="Arial"/>
               </a:rPr>
-              <a:t>Files will be copied to remote hosts (with proper code)</a:t>
+              <a:t>Low precedence, so can be overridden</a:t>
+            </a:r>
+            <a:endParaRPr b="0" lang="en-US" sz="2100" spc="-1" strike="noStrike">
+              <a:solidFill>
+                <a:srgbClr val="009bdd"/>
+              </a:solidFill>
+              <a:latin typeface="Arial"/>
+            </a:endParaRPr>
+          </a:p>
+          <a:p>
+            <a:pPr lvl="1" marL="864000" indent="-324000">
+              <a:spcBef>
+                <a:spcPts val="850"/>
+              </a:spcBef>
+              <a:buClr>
+                <a:srgbClr val="77caee"/>
+              </a:buClr>
+              <a:buSzPct val="45000"/>
+              <a:buFont typeface="Wingdings" charset="2"/>
+              <a:buChar char=""/>
+            </a:pPr>
+            <a:r>
+              <a:rPr b="0" lang="en-US" sz="2100" spc="-1" strike="noStrike">
+                <a:solidFill>
+                  <a:srgbClr val="009bdd"/>
+                </a:solidFill>
+                <a:latin typeface="Arial"/>
+              </a:rPr>
+              <a:t>Use as document showing all inputs, with examples</a:t>
             </a:r>
             <a:endParaRPr b="0" lang="en-US" sz="2100" spc="-1" strike="noStrike">
               <a:solidFill>
@@ -4297,7 +4326,7 @@
                 </a:solidFill>
                 <a:latin typeface="Arial"/>
               </a:rPr>
-              <a:t>Tasks</a:t>
+              <a:t>Files</a:t>
             </a:r>
             <a:endParaRPr b="0" lang="en-US" sz="2400" spc="-1" strike="noStrike">
               <a:solidFill>
@@ -4325,7 +4354,7 @@
                 </a:solidFill>
                 <a:latin typeface="Arial"/>
               </a:rPr>
-              <a:t>Lists of tasks to perform on a host</a:t>
+              <a:t>Store files for this specific role</a:t>
             </a:r>
             <a:endParaRPr b="0" lang="en-US" sz="2100" spc="-1" strike="noStrike">
               <a:solidFill>
@@ -4353,121 +4382,9 @@
                 </a:solidFill>
                 <a:latin typeface="Arial"/>
               </a:rPr>
-              <a:t>Uses data from defaults and vars, and other variable sources</a:t>
+              <a:t>Files will be copied to remote hosts (with proper code)</a:t>
             </a:r>
             <a:endParaRPr b="0" lang="en-US" sz="2100" spc="-1" strike="noStrike">
-              <a:solidFill>
-                <a:srgbClr val="009bdd"/>
-              </a:solidFill>
-              <a:latin typeface="Arial"/>
-            </a:endParaRPr>
-          </a:p>
-          <a:p>
-            <a:pPr lvl="1" marL="864000" indent="-324000">
-              <a:spcBef>
-                <a:spcPts val="850"/>
-              </a:spcBef>
-              <a:buClr>
-                <a:srgbClr val="77caee"/>
-              </a:buClr>
-              <a:buSzPct val="45000"/>
-              <a:buFont typeface="Wingdings" charset="2"/>
-              <a:buChar char=""/>
-            </a:pPr>
-            <a:r>
-              <a:rPr b="0" lang="en-US" sz="2100" spc="-1" strike="noStrike">
-                <a:solidFill>
-                  <a:srgbClr val="009bdd"/>
-                </a:solidFill>
-                <a:latin typeface="Arial"/>
-              </a:rPr>
-              <a:t>Set of steps processed in order</a:t>
-            </a:r>
-            <a:endParaRPr b="0" lang="en-US" sz="2100" spc="-1" strike="noStrike">
-              <a:solidFill>
-                <a:srgbClr val="009bdd"/>
-              </a:solidFill>
-              <a:latin typeface="Arial"/>
-            </a:endParaRPr>
-          </a:p>
-          <a:p>
-            <a:pPr lvl="1" marL="864000" indent="-324000">
-              <a:spcBef>
-                <a:spcPts val="850"/>
-              </a:spcBef>
-              <a:buClr>
-                <a:srgbClr val="77caee"/>
-              </a:buClr>
-              <a:buSzPct val="45000"/>
-              <a:buFont typeface="Wingdings" charset="2"/>
-              <a:buChar char=""/>
-            </a:pPr>
-            <a:r>
-              <a:rPr b="0" lang="en-US" sz="2100" spc="-1" strike="noStrike">
-                <a:solidFill>
-                  <a:srgbClr val="009bdd"/>
-                </a:solidFill>
-                <a:latin typeface="Arial"/>
-              </a:rPr>
-              <a:t>Can use conditionals to perform steps under specific circumstances</a:t>
-            </a:r>
-            <a:endParaRPr b="0" lang="en-US" sz="2100" spc="-1" strike="noStrike">
-              <a:solidFill>
-                <a:srgbClr val="009bdd"/>
-              </a:solidFill>
-              <a:latin typeface="Arial"/>
-            </a:endParaRPr>
-          </a:p>
-          <a:p>
-            <a:pPr lvl="2" marL="1296000" indent="-288000">
-              <a:spcBef>
-                <a:spcPts val="635"/>
-              </a:spcBef>
-              <a:buClr>
-                <a:srgbClr val="77caee"/>
-              </a:buClr>
-              <a:buSzPct val="45000"/>
-              <a:buFont typeface="Wingdings" charset="2"/>
-              <a:buChar char=""/>
-            </a:pPr>
-            <a:r>
-              <a:rPr b="0" lang="en-US" sz="1800" spc="-1" strike="noStrike">
-                <a:solidFill>
-                  <a:srgbClr val="009bdd"/>
-                </a:solidFill>
-                <a:latin typeface="Arial"/>
-              </a:rPr>
-              <a:t>enable/disable features</a:t>
-            </a:r>
-            <a:endParaRPr b="0" lang="en-US" sz="1800" spc="-1" strike="noStrike">
-              <a:solidFill>
-                <a:srgbClr val="009bdd"/>
-              </a:solidFill>
-              <a:latin typeface="Arial"/>
-            </a:endParaRPr>
-          </a:p>
-          <a:p>
-            <a:pPr lvl="2" marL="1296000" indent="-288000">
-              <a:spcBef>
-                <a:spcPts val="635"/>
-              </a:spcBef>
-              <a:buClr>
-                <a:srgbClr val="77caee"/>
-              </a:buClr>
-              <a:buSzPct val="45000"/>
-              <a:buFont typeface="Wingdings" charset="2"/>
-              <a:buChar char=""/>
-            </a:pPr>
-            <a:r>
-              <a:rPr b="0" lang="en-US" sz="1800" spc="-1" strike="noStrike">
-                <a:solidFill>
-                  <a:srgbClr val="009bdd"/>
-                </a:solidFill>
-                <a:latin typeface="Arial"/>
-              </a:rPr>
-              <a:t>Use different packages for different distributions</a:t>
-            </a:r>
-            <a:endParaRPr b="0" lang="en-US" sz="1800" spc="-1" strike="noStrike">
               <a:solidFill>
                 <a:srgbClr val="009bdd"/>
               </a:solidFill>
@@ -4591,7 +4508,7 @@
                 </a:solidFill>
                 <a:latin typeface="Arial"/>
               </a:rPr>
-              <a:t>Templates</a:t>
+              <a:t>Tasks</a:t>
             </a:r>
             <a:endParaRPr b="0" lang="en-US" sz="2400" spc="-1" strike="noStrike">
               <a:solidFill>
@@ -4619,7 +4536,7 @@
                 </a:solidFill>
                 <a:latin typeface="Arial"/>
               </a:rPr>
-              <a:t>Updating files with variable substitution</a:t>
+              <a:t>Lists of tasks to perform on a host</a:t>
             </a:r>
             <a:endParaRPr b="0" lang="en-US" sz="2100" spc="-1" strike="noStrike">
               <a:solidFill>
@@ -4647,9 +4564,121 @@
                 </a:solidFill>
                 <a:latin typeface="Arial"/>
               </a:rPr>
-              <a:t>Uses jinja2 templating</a:t>
+              <a:t>Uses data from defaults and vars, and other variable sources</a:t>
             </a:r>
             <a:endParaRPr b="0" lang="en-US" sz="2100" spc="-1" strike="noStrike">
+              <a:solidFill>
+                <a:srgbClr val="009bdd"/>
+              </a:solidFill>
+              <a:latin typeface="Arial"/>
+            </a:endParaRPr>
+          </a:p>
+          <a:p>
+            <a:pPr lvl="1" marL="864000" indent="-324000">
+              <a:spcBef>
+                <a:spcPts val="850"/>
+              </a:spcBef>
+              <a:buClr>
+                <a:srgbClr val="77caee"/>
+              </a:buClr>
+              <a:buSzPct val="45000"/>
+              <a:buFont typeface="Wingdings" charset="2"/>
+              <a:buChar char=""/>
+            </a:pPr>
+            <a:r>
+              <a:rPr b="0" lang="en-US" sz="2100" spc="-1" strike="noStrike">
+                <a:solidFill>
+                  <a:srgbClr val="009bdd"/>
+                </a:solidFill>
+                <a:latin typeface="Arial"/>
+              </a:rPr>
+              <a:t>Set of steps processed in order</a:t>
+            </a:r>
+            <a:endParaRPr b="0" lang="en-US" sz="2100" spc="-1" strike="noStrike">
+              <a:solidFill>
+                <a:srgbClr val="009bdd"/>
+              </a:solidFill>
+              <a:latin typeface="Arial"/>
+            </a:endParaRPr>
+          </a:p>
+          <a:p>
+            <a:pPr lvl="1" marL="864000" indent="-324000">
+              <a:spcBef>
+                <a:spcPts val="850"/>
+              </a:spcBef>
+              <a:buClr>
+                <a:srgbClr val="77caee"/>
+              </a:buClr>
+              <a:buSzPct val="45000"/>
+              <a:buFont typeface="Wingdings" charset="2"/>
+              <a:buChar char=""/>
+            </a:pPr>
+            <a:r>
+              <a:rPr b="0" lang="en-US" sz="2100" spc="-1" strike="noStrike">
+                <a:solidFill>
+                  <a:srgbClr val="009bdd"/>
+                </a:solidFill>
+                <a:latin typeface="Arial"/>
+              </a:rPr>
+              <a:t>Can use conditionals to perform steps under specific circumstances</a:t>
+            </a:r>
+            <a:endParaRPr b="0" lang="en-US" sz="2100" spc="-1" strike="noStrike">
+              <a:solidFill>
+                <a:srgbClr val="009bdd"/>
+              </a:solidFill>
+              <a:latin typeface="Arial"/>
+            </a:endParaRPr>
+          </a:p>
+          <a:p>
+            <a:pPr lvl="2" marL="1296000" indent="-288000">
+              <a:spcBef>
+                <a:spcPts val="635"/>
+              </a:spcBef>
+              <a:buClr>
+                <a:srgbClr val="77caee"/>
+              </a:buClr>
+              <a:buSzPct val="45000"/>
+              <a:buFont typeface="Wingdings" charset="2"/>
+              <a:buChar char=""/>
+            </a:pPr>
+            <a:r>
+              <a:rPr b="0" lang="en-US" sz="1800" spc="-1" strike="noStrike">
+                <a:solidFill>
+                  <a:srgbClr val="009bdd"/>
+                </a:solidFill>
+                <a:latin typeface="Arial"/>
+              </a:rPr>
+              <a:t>enable/disable features</a:t>
+            </a:r>
+            <a:endParaRPr b="0" lang="en-US" sz="1800" spc="-1" strike="noStrike">
+              <a:solidFill>
+                <a:srgbClr val="009bdd"/>
+              </a:solidFill>
+              <a:latin typeface="Arial"/>
+            </a:endParaRPr>
+          </a:p>
+          <a:p>
+            <a:pPr lvl="2" marL="1296000" indent="-288000">
+              <a:spcBef>
+                <a:spcPts val="635"/>
+              </a:spcBef>
+              <a:buClr>
+                <a:srgbClr val="77caee"/>
+              </a:buClr>
+              <a:buSzPct val="45000"/>
+              <a:buFont typeface="Wingdings" charset="2"/>
+              <a:buChar char=""/>
+            </a:pPr>
+            <a:r>
+              <a:rPr b="0" lang="en-US" sz="1800" spc="-1" strike="noStrike">
+                <a:solidFill>
+                  <a:srgbClr val="009bdd"/>
+                </a:solidFill>
+                <a:latin typeface="Arial"/>
+              </a:rPr>
+              <a:t>Use different packages for different distributions</a:t>
+            </a:r>
+            <a:endParaRPr b="0" lang="en-US" sz="1800" spc="-1" strike="noStrike">
               <a:solidFill>
                 <a:srgbClr val="009bdd"/>
               </a:solidFill>
@@ -4773,7 +4802,7 @@
                 </a:solidFill>
                 <a:latin typeface="Arial"/>
               </a:rPr>
-              <a:t>Template Example</a:t>
+              <a:t>Templates</a:t>
             </a:r>
             <a:endParaRPr b="0" lang="en-US" sz="2400" spc="-1" strike="noStrike">
               <a:solidFill>
@@ -4783,139 +4812,55 @@
             </a:endParaRPr>
           </a:p>
           <a:p>
-            <a:pPr marL="432000" indent="-324000">
-              <a:spcBef>
-                <a:spcPts val="1060"/>
-              </a:spcBef>
-              <a:buClr>
-                <a:srgbClr val="77caee"/>
-              </a:buClr>
-              <a:buSzPct val="45000"/>
-              <a:buFont typeface="Wingdings" charset="2"/>
-              <a:buChar char=""/>
-            </a:pPr>
-            <a:r>
-              <a:rPr b="0" lang="en-US" sz="2400" spc="-1" strike="noStrike">
-                <a:solidFill>
-                  <a:srgbClr val="009bdd"/>
-                </a:solidFill>
-                <a:latin typeface="Arial"/>
-              </a:rPr>
-              <a:t># Mysql my.cnf file</a:t>
-            </a:r>
-            <a:endParaRPr b="0" lang="en-US" sz="2400" spc="-1" strike="noStrike">
-              <a:solidFill>
-                <a:srgbClr val="009bdd"/>
-              </a:solidFill>
-              <a:latin typeface="Arial"/>
-            </a:endParaRPr>
-          </a:p>
-          <a:p>
-            <a:pPr marL="432000" indent="-324000">
-              <a:spcBef>
-                <a:spcPts val="1060"/>
-              </a:spcBef>
-              <a:buClr>
-                <a:srgbClr val="77caee"/>
-              </a:buClr>
-              <a:buSzPct val="45000"/>
-              <a:buFont typeface="Wingdings" charset="2"/>
-              <a:buChar char=""/>
-            </a:pPr>
-            <a:r>
-              <a:rPr b="0" lang="en-US" sz="2400" spc="-1" strike="noStrike">
-                <a:solidFill>
-                  <a:srgbClr val="009bdd"/>
-                </a:solidFill>
-                <a:latin typeface="Arial"/>
-              </a:rPr>
-              <a:t>[mysql]</a:t>
-            </a:r>
-            <a:endParaRPr b="0" lang="en-US" sz="2400" spc="-1" strike="noStrike">
-              <a:solidFill>
-                <a:srgbClr val="009bdd"/>
-              </a:solidFill>
-              <a:latin typeface="Arial"/>
-            </a:endParaRPr>
-          </a:p>
-          <a:p>
-            <a:pPr marL="432000" indent="-324000">
-              <a:spcBef>
-                <a:spcPts val="1060"/>
-              </a:spcBef>
-              <a:buClr>
-                <a:srgbClr val="77caee"/>
-              </a:buClr>
-              <a:buSzPct val="45000"/>
-              <a:buFont typeface="Wingdings" charset="2"/>
-              <a:buChar char=""/>
-            </a:pPr>
-            <a:r>
-              <a:rPr b="0" lang="en-US" sz="2400" spc="-1" strike="noStrike">
-                <a:solidFill>
-                  <a:srgbClr val="009bdd"/>
-                </a:solidFill>
-                <a:latin typeface="Arial"/>
-              </a:rPr>
-              <a:t>user = root</a:t>
-            </a:r>
-            <a:endParaRPr b="0" lang="en-US" sz="2400" spc="-1" strike="noStrike">
-              <a:solidFill>
-                <a:srgbClr val="009bdd"/>
-              </a:solidFill>
-              <a:latin typeface="Arial"/>
-            </a:endParaRPr>
-          </a:p>
-          <a:p>
-            <a:pPr marL="432000" indent="-324000">
-              <a:spcBef>
-                <a:spcPts val="1060"/>
-              </a:spcBef>
-              <a:buClr>
-                <a:srgbClr val="77caee"/>
-              </a:buClr>
-              <a:buSzPct val="45000"/>
-              <a:buFont typeface="Wingdings" charset="2"/>
-              <a:buChar char=""/>
-            </a:pPr>
-            <a:r>
-              <a:rPr b="0" lang="en-US" sz="2400" spc="-1" strike="noStrike">
-                <a:solidFill>
-                  <a:srgbClr val="009bdd"/>
-                </a:solidFill>
-                <a:latin typeface="Arial"/>
-              </a:rPr>
-              <a:t>password = {{ mysql_pass }}</a:t>
-            </a:r>
-            <a:endParaRPr b="0" lang="en-US" sz="2400" spc="-1" strike="noStrike">
-              <a:solidFill>
-                <a:srgbClr val="009bdd"/>
-              </a:solidFill>
-              <a:latin typeface="Arial"/>
-            </a:endParaRPr>
-          </a:p>
-          <a:p>
-            <a:pPr marL="432000" indent="-324000">
-              <a:spcBef>
-                <a:spcPts val="1060"/>
-              </a:spcBef>
-              <a:buClr>
-                <a:srgbClr val="77caee"/>
-              </a:buClr>
-              <a:buSzPct val="45000"/>
-              <a:buFont typeface="Wingdings" charset="2"/>
-              <a:buChar char=""/>
-            </a:pPr>
-            <a:r>
-              <a:rPr b="0" lang="en-US" sz="2400" spc="-1" strike="noStrike">
-                <a:solidFill>
-                  <a:srgbClr val="009bdd"/>
-                </a:solidFill>
-                <a:latin typeface="Arial"/>
-              </a:rPr>
-              <a:t>{{ mysql_pass }} will be replaced with value of mysql_pass</a:t>
-            </a:r>
-            <a:endParaRPr b="0" lang="en-US" sz="2400" spc="-1" strike="noStrike">
+            <a:pPr lvl="1" marL="864000" indent="-324000">
+              <a:spcBef>
+                <a:spcPts val="850"/>
+              </a:spcBef>
+              <a:buClr>
+                <a:srgbClr val="77caee"/>
+              </a:buClr>
+              <a:buSzPct val="45000"/>
+              <a:buFont typeface="Wingdings" charset="2"/>
+              <a:buChar char=""/>
+            </a:pPr>
+            <a:r>
+              <a:rPr b="0" lang="en-US" sz="2100" spc="-1" strike="noStrike">
+                <a:solidFill>
+                  <a:srgbClr val="009bdd"/>
+                </a:solidFill>
+                <a:latin typeface="Arial"/>
+              </a:rPr>
+              <a:t>Updating files with variable substitution</a:t>
+            </a:r>
+            <a:endParaRPr b="0" lang="en-US" sz="2100" spc="-1" strike="noStrike">
+              <a:solidFill>
+                <a:srgbClr val="009bdd"/>
+              </a:solidFill>
+              <a:latin typeface="Arial"/>
+            </a:endParaRPr>
+          </a:p>
+          <a:p>
+            <a:pPr lvl="1" marL="864000" indent="-324000">
+              <a:spcBef>
+                <a:spcPts val="850"/>
+              </a:spcBef>
+              <a:buClr>
+                <a:srgbClr val="77caee"/>
+              </a:buClr>
+              <a:buSzPct val="45000"/>
+              <a:buFont typeface="Wingdings" charset="2"/>
+              <a:buChar char=""/>
+            </a:pPr>
+            <a:r>
+              <a:rPr b="0" lang="en-US" sz="2100" spc="-1" strike="noStrike">
+                <a:solidFill>
+                  <a:srgbClr val="009bdd"/>
+                </a:solidFill>
+                <a:latin typeface="Arial"/>
+              </a:rPr>
+              <a:t>Uses jinja2 templating</a:t>
+            </a:r>
+            <a:endParaRPr b="0" lang="en-US" sz="2100" spc="-1" strike="noStrike">
               <a:solidFill>
                 <a:srgbClr val="009bdd"/>
               </a:solidFill>
@@ -4986,7 +4931,7 @@
                 </a:solidFill>
                 <a:latin typeface="Arial"/>
               </a:rPr>
-              <a:t>Pitfalls</a:t>
+              <a:t>Role Structure</a:t>
             </a:r>
             <a:endParaRPr b="0" lang="en-US" sz="3300" spc="-1" strike="noStrike">
               <a:solidFill>
@@ -5039,7 +4984,7 @@
                 </a:solidFill>
                 <a:latin typeface="Arial"/>
               </a:rPr>
-              <a:t>Global variables</a:t>
+              <a:t>Template Example</a:t>
             </a:r>
             <a:endParaRPr b="0" lang="en-US" sz="2400" spc="-1" strike="noStrike">
               <a:solidFill>
@@ -5067,7 +5012,7 @@
                 </a:solidFill>
                 <a:latin typeface="Arial"/>
               </a:rPr>
-              <a:t>Hard to change values</a:t>
+              <a:t># Mysql my.cnf file</a:t>
             </a:r>
             <a:endParaRPr b="0" lang="en-US" sz="2400" spc="-1" strike="noStrike">
               <a:solidFill>
@@ -5077,34 +5022,6 @@
             </a:endParaRPr>
           </a:p>
           <a:p>
-            <a:pPr lvl="1" marL="864000" indent="-324000">
-              <a:spcBef>
-                <a:spcPts val="850"/>
-              </a:spcBef>
-              <a:buClr>
-                <a:srgbClr val="77caee"/>
-              </a:buClr>
-              <a:buSzPct val="45000"/>
-              <a:buFont typeface="Wingdings" charset="2"/>
-              <a:buChar char=""/>
-            </a:pPr>
-            <a:r>
-              <a:rPr b="0" lang="en-US" sz="2100" spc="-1" strike="noStrike">
-                <a:solidFill>
-                  <a:srgbClr val="009bdd"/>
-                </a:solidFill>
-                <a:latin typeface="Arial"/>
-              </a:rPr>
-              <a:t>Create new variables</a:t>
-            </a:r>
-            <a:endParaRPr b="0" lang="en-US" sz="2100" spc="-1" strike="noStrike">
-              <a:solidFill>
-                <a:srgbClr val="009bdd"/>
-              </a:solidFill>
-              <a:latin typeface="Arial"/>
-            </a:endParaRPr>
-          </a:p>
-          <a:p>
             <a:pPr marL="432000" indent="-324000">
               <a:spcBef>
                 <a:spcPts val="1060"/>
@@ -5123,7 +5040,7 @@
                 </a:solidFill>
                 <a:latin typeface="Arial"/>
               </a:rPr>
-              <a:t>Name conflicts</a:t>
+              <a:t>[mysql]</a:t>
             </a:r>
             <a:endParaRPr b="0" lang="en-US" sz="2400" spc="-1" strike="noStrike">
               <a:solidFill>
@@ -5151,7 +5068,7 @@
                 </a:solidFill>
                 <a:latin typeface="Arial"/>
               </a:rPr>
-              <a:t>Variables aren’t typed</a:t>
+              <a:t>user = root</a:t>
             </a:r>
             <a:endParaRPr b="0" lang="en-US" sz="2400" spc="-1" strike="noStrike">
               <a:solidFill>
@@ -5179,7 +5096,7 @@
                 </a:solidFill>
                 <a:latin typeface="Arial"/>
               </a:rPr>
-              <a:t>Variable precedence</a:t>
+              <a:t>password = {{ mysql_pass }}</a:t>
             </a:r>
             <a:endParaRPr b="0" lang="en-US" sz="2400" spc="-1" strike="noStrike">
               <a:solidFill>
@@ -5207,7 +5124,7 @@
                 </a:solidFill>
                 <a:latin typeface="Arial"/>
               </a:rPr>
-              <a:t>Everything is permitted</a:t>
+              <a:t>{{ mysql_pass }} will be replaced with value of mysql_pass</a:t>
             </a:r>
             <a:endParaRPr b="0" lang="en-US" sz="2400" spc="-1" strike="noStrike">
               <a:solidFill>
@@ -5280,7 +5197,7 @@
                 </a:solidFill>
                 <a:latin typeface="Arial"/>
               </a:rPr>
-              <a:t>Molecule</a:t>
+              <a:t>Pitfalls</a:t>
             </a:r>
             <a:endParaRPr b="0" lang="en-US" sz="3300" spc="-1" strike="noStrike">
               <a:solidFill>
@@ -5333,7 +5250,7 @@
                 </a:solidFill>
                 <a:latin typeface="Arial"/>
               </a:rPr>
-              <a:t>Created by Cisco</a:t>
+              <a:t>Global variables</a:t>
             </a:r>
             <a:endParaRPr b="0" lang="en-US" sz="2400" spc="-1" strike="noStrike">
               <a:solidFill>
@@ -5361,7 +5278,7 @@
                 </a:solidFill>
                 <a:latin typeface="Arial"/>
               </a:rPr>
-              <a:t>Donated to Red Hat Ansible project in 2019</a:t>
+              <a:t>Hard to change values</a:t>
             </a:r>
             <a:endParaRPr b="0" lang="en-US" sz="2400" spc="-1" strike="noStrike">
               <a:solidFill>
@@ -5371,6 +5288,34 @@
             </a:endParaRPr>
           </a:p>
           <a:p>
+            <a:pPr lvl="1" marL="864000" indent="-324000">
+              <a:spcBef>
+                <a:spcPts val="850"/>
+              </a:spcBef>
+              <a:buClr>
+                <a:srgbClr val="77caee"/>
+              </a:buClr>
+              <a:buSzPct val="45000"/>
+              <a:buFont typeface="Wingdings" charset="2"/>
+              <a:buChar char=""/>
+            </a:pPr>
+            <a:r>
+              <a:rPr b="0" lang="en-US" sz="2100" spc="-1" strike="noStrike">
+                <a:solidFill>
+                  <a:srgbClr val="009bdd"/>
+                </a:solidFill>
+                <a:latin typeface="Arial"/>
+              </a:rPr>
+              <a:t>Create new variables</a:t>
+            </a:r>
+            <a:endParaRPr b="0" lang="en-US" sz="2100" spc="-1" strike="noStrike">
+              <a:solidFill>
+                <a:srgbClr val="009bdd"/>
+              </a:solidFill>
+              <a:latin typeface="Arial"/>
+            </a:endParaRPr>
+          </a:p>
+          <a:p>
             <a:pPr marL="432000" indent="-324000">
               <a:spcBef>
                 <a:spcPts val="1060"/>
@@ -5389,7 +5334,7 @@
                 </a:solidFill>
                 <a:latin typeface="Arial"/>
               </a:rPr>
-              <a:t>Used to test your roles</a:t>
+              <a:t>Name conflicts</a:t>
             </a:r>
             <a:endParaRPr b="0" lang="en-US" sz="2400" spc="-1" strike="noStrike">
               <a:solidFill>
@@ -5417,7 +5362,7 @@
                 </a:solidFill>
                 <a:latin typeface="Arial"/>
               </a:rPr>
-              <a:t>Uses galaxy to create roles</a:t>
+              <a:t>Variables aren’t typed</a:t>
             </a:r>
             <a:endParaRPr b="0" lang="en-US" sz="2400" spc="-1" strike="noStrike">
               <a:solidFill>
@@ -5427,55 +5372,55 @@
             </a:endParaRPr>
           </a:p>
           <a:p>
-            <a:pPr lvl="1" marL="864000" indent="-324000">
-              <a:spcBef>
-                <a:spcPts val="850"/>
-              </a:spcBef>
-              <a:buClr>
-                <a:srgbClr val="77caee"/>
-              </a:buClr>
-              <a:buSzPct val="45000"/>
-              <a:buFont typeface="Wingdings" charset="2"/>
-              <a:buChar char=""/>
-            </a:pPr>
-            <a:r>
-              <a:rPr b="0" lang="en-US" sz="2100" spc="-1" strike="noStrike">
-                <a:solidFill>
-                  <a:srgbClr val="009bdd"/>
-                </a:solidFill>
-                <a:latin typeface="Arial"/>
-              </a:rPr>
-              <a:t> </a:t>
-            </a:r>
-            <a:endParaRPr b="0" lang="en-US" sz="2100" spc="-1" strike="noStrike">
-              <a:solidFill>
-                <a:srgbClr val="009bdd"/>
-              </a:solidFill>
-              <a:latin typeface="Arial"/>
-            </a:endParaRPr>
-          </a:p>
-          <a:p>
-            <a:pPr lvl="1" marL="864000" indent="-324000">
-              <a:spcBef>
-                <a:spcPts val="850"/>
-              </a:spcBef>
-              <a:buClr>
-                <a:srgbClr val="77caee"/>
-              </a:buClr>
-              <a:buSzPct val="45000"/>
-              <a:buFont typeface="Wingdings" charset="2"/>
-              <a:buChar char=""/>
-            </a:pPr>
-            <a:r>
-              <a:rPr b="0" lang="en-US" sz="2100" spc="-1" strike="noStrike">
-                <a:solidFill>
-                  <a:srgbClr val="009bdd"/>
-                </a:solidFill>
-                <a:latin typeface="Arial"/>
-              </a:rPr>
-              <a:t> </a:t>
-            </a:r>
-            <a:endParaRPr b="0" lang="en-US" sz="2100" spc="-1" strike="noStrike">
+            <a:pPr marL="432000" indent="-324000">
+              <a:spcBef>
+                <a:spcPts val="1060"/>
+              </a:spcBef>
+              <a:buClr>
+                <a:srgbClr val="77caee"/>
+              </a:buClr>
+              <a:buSzPct val="45000"/>
+              <a:buFont typeface="Wingdings" charset="2"/>
+              <a:buChar char=""/>
+            </a:pPr>
+            <a:r>
+              <a:rPr b="0" lang="en-US" sz="2400" spc="-1" strike="noStrike">
+                <a:solidFill>
+                  <a:srgbClr val="009bdd"/>
+                </a:solidFill>
+                <a:latin typeface="Arial"/>
+              </a:rPr>
+              <a:t>Variable precedence</a:t>
+            </a:r>
+            <a:endParaRPr b="0" lang="en-US" sz="2400" spc="-1" strike="noStrike">
+              <a:solidFill>
+                <a:srgbClr val="009bdd"/>
+              </a:solidFill>
+              <a:latin typeface="Arial"/>
+            </a:endParaRPr>
+          </a:p>
+          <a:p>
+            <a:pPr marL="432000" indent="-324000">
+              <a:spcBef>
+                <a:spcPts val="1060"/>
+              </a:spcBef>
+              <a:buClr>
+                <a:srgbClr val="77caee"/>
+              </a:buClr>
+              <a:buSzPct val="45000"/>
+              <a:buFont typeface="Wingdings" charset="2"/>
+              <a:buChar char=""/>
+            </a:pPr>
+            <a:r>
+              <a:rPr b="0" lang="en-US" sz="2400" spc="-1" strike="noStrike">
+                <a:solidFill>
+                  <a:srgbClr val="009bdd"/>
+                </a:solidFill>
+                <a:latin typeface="Arial"/>
+              </a:rPr>
+              <a:t>Everything is permitted</a:t>
+            </a:r>
+            <a:endParaRPr b="0" lang="en-US" sz="2400" spc="-1" strike="noStrike">
               <a:solidFill>
                 <a:srgbClr val="009bdd"/>
               </a:solidFill>
@@ -5599,7 +5544,7 @@
                 </a:solidFill>
                 <a:latin typeface="Arial"/>
               </a:rPr>
-              <a:t>molecule init role user.example -d docker</a:t>
+              <a:t>Created by Cisco</a:t>
             </a:r>
             <a:endParaRPr b="0" lang="en-US" sz="2400" spc="-1" strike="noStrike">
               <a:solidFill>
@@ -5609,6 +5554,90 @@
             </a:endParaRPr>
           </a:p>
           <a:p>
+            <a:pPr marL="432000" indent="-324000">
+              <a:spcBef>
+                <a:spcPts val="1060"/>
+              </a:spcBef>
+              <a:buClr>
+                <a:srgbClr val="77caee"/>
+              </a:buClr>
+              <a:buSzPct val="45000"/>
+              <a:buFont typeface="Wingdings" charset="2"/>
+              <a:buChar char=""/>
+            </a:pPr>
+            <a:r>
+              <a:rPr b="0" lang="en-US" sz="2400" spc="-1" strike="noStrike">
+                <a:solidFill>
+                  <a:srgbClr val="009bdd"/>
+                </a:solidFill>
+                <a:latin typeface="Arial"/>
+              </a:rPr>
+              <a:t>Donated to Red Hat Ansible project in 2019</a:t>
+            </a:r>
+            <a:endParaRPr b="0" lang="en-US" sz="2400" spc="-1" strike="noStrike">
+              <a:solidFill>
+                <a:srgbClr val="009bdd"/>
+              </a:solidFill>
+              <a:latin typeface="Arial"/>
+            </a:endParaRPr>
+          </a:p>
+          <a:p>
+            <a:pPr marL="432000" indent="-324000">
+              <a:spcBef>
+                <a:spcPts val="1060"/>
+              </a:spcBef>
+              <a:buClr>
+                <a:srgbClr val="77caee"/>
+              </a:buClr>
+              <a:buSzPct val="45000"/>
+              <a:buFont typeface="Wingdings" charset="2"/>
+              <a:buChar char=""/>
+            </a:pPr>
+            <a:r>
+              <a:rPr b="0" lang="en-US" sz="2400" spc="-1" strike="noStrike">
+                <a:solidFill>
+                  <a:srgbClr val="009bdd"/>
+                </a:solidFill>
+                <a:latin typeface="Arial"/>
+              </a:rPr>
+              <a:t>Used to test your roles</a:t>
+            </a:r>
+            <a:endParaRPr b="0" lang="en-US" sz="2400" spc="-1" strike="noStrike">
+              <a:solidFill>
+                <a:srgbClr val="009bdd"/>
+              </a:solidFill>
+              <a:latin typeface="Arial"/>
+            </a:endParaRPr>
+          </a:p>
+          <a:p>
+            <a:pPr marL="432000" indent="-324000">
+              <a:spcBef>
+                <a:spcPts val="1060"/>
+              </a:spcBef>
+              <a:buClr>
+                <a:srgbClr val="77caee"/>
+              </a:buClr>
+              <a:buSzPct val="45000"/>
+              <a:buFont typeface="Wingdings" charset="2"/>
+              <a:buChar char=""/>
+            </a:pPr>
+            <a:r>
+              <a:rPr b="0" lang="en-US" sz="2400" spc="-1" strike="noStrike">
+                <a:solidFill>
+                  <a:srgbClr val="009bdd"/>
+                </a:solidFill>
+                <a:latin typeface="Arial"/>
+              </a:rPr>
+              <a:t>Uses galaxy to create roles</a:t>
+            </a:r>
+            <a:endParaRPr b="0" lang="en-US" sz="2400" spc="-1" strike="noStrike">
+              <a:solidFill>
+                <a:srgbClr val="009bdd"/>
+              </a:solidFill>
+              <a:latin typeface="Arial"/>
+            </a:endParaRPr>
+          </a:p>
+          <a:p>
             <a:pPr lvl="1" marL="864000" indent="-324000">
               <a:spcBef>
                 <a:spcPts val="850"/>
@@ -5627,7 +5656,7 @@
                 </a:solidFill>
                 <a:latin typeface="Arial"/>
               </a:rPr>
-              <a:t>molecule init scenario -r &lt;current role&gt; -d docker</a:t>
+              <a:t> </a:t>
             </a:r>
             <a:endParaRPr b="0" lang="en-US" sz="2100" spc="-1" strike="noStrike">
               <a:solidFill>
@@ -5637,34 +5666,6 @@
             </a:endParaRPr>
           </a:p>
           <a:p>
-            <a:pPr marL="432000" indent="-324000">
-              <a:spcBef>
-                <a:spcPts val="1060"/>
-              </a:spcBef>
-              <a:buClr>
-                <a:srgbClr val="77caee"/>
-              </a:buClr>
-              <a:buSzPct val="45000"/>
-              <a:buFont typeface="Wingdings" charset="2"/>
-              <a:buChar char=""/>
-            </a:pPr>
-            <a:r>
-              <a:rPr b="0" lang="en-US" sz="2400" spc="-1" strike="noStrike">
-                <a:solidFill>
-                  <a:srgbClr val="009bdd"/>
-                </a:solidFill>
-                <a:latin typeface="Arial"/>
-              </a:rPr>
-              <a:t>molecule converge</a:t>
-            </a:r>
-            <a:endParaRPr b="0" lang="en-US" sz="2400" spc="-1" strike="noStrike">
-              <a:solidFill>
-                <a:srgbClr val="009bdd"/>
-              </a:solidFill>
-              <a:latin typeface="Arial"/>
-            </a:endParaRPr>
-          </a:p>
-          <a:p>
             <a:pPr lvl="1" marL="864000" indent="-324000">
               <a:spcBef>
                 <a:spcPts val="850"/>
@@ -5683,121 +5684,9 @@
                 </a:solidFill>
                 <a:latin typeface="Arial"/>
               </a:rPr>
-              <a:t>Work on the role</a:t>
+              <a:t> </a:t>
             </a:r>
             <a:endParaRPr b="0" lang="en-US" sz="2100" spc="-1" strike="noStrike">
-              <a:solidFill>
-                <a:srgbClr val="009bdd"/>
-              </a:solidFill>
-              <a:latin typeface="Arial"/>
-            </a:endParaRPr>
-          </a:p>
-          <a:p>
-            <a:pPr marL="432000" indent="-324000">
-              <a:spcBef>
-                <a:spcPts val="1060"/>
-              </a:spcBef>
-              <a:buClr>
-                <a:srgbClr val="77caee"/>
-              </a:buClr>
-              <a:buSzPct val="45000"/>
-              <a:buFont typeface="Wingdings" charset="2"/>
-              <a:buChar char=""/>
-            </a:pPr>
-            <a:r>
-              <a:rPr b="0" lang="en-US" sz="2400" spc="-1" strike="noStrike">
-                <a:solidFill>
-                  <a:srgbClr val="009bdd"/>
-                </a:solidFill>
-                <a:latin typeface="Arial"/>
-              </a:rPr>
-              <a:t>molecule converge</a:t>
-            </a:r>
-            <a:endParaRPr b="0" lang="en-US" sz="2400" spc="-1" strike="noStrike">
-              <a:solidFill>
-                <a:srgbClr val="009bdd"/>
-              </a:solidFill>
-              <a:latin typeface="Arial"/>
-            </a:endParaRPr>
-          </a:p>
-          <a:p>
-            <a:pPr lvl="1" marL="864000" indent="-324000">
-              <a:spcBef>
-                <a:spcPts val="850"/>
-              </a:spcBef>
-              <a:buClr>
-                <a:srgbClr val="77caee"/>
-              </a:buClr>
-              <a:buSzPct val="45000"/>
-              <a:buFont typeface="Wingdings" charset="2"/>
-              <a:buChar char=""/>
-            </a:pPr>
-            <a:r>
-              <a:rPr b="0" lang="en-US" sz="2100" spc="-1" strike="noStrike">
-                <a:solidFill>
-                  <a:srgbClr val="009bdd"/>
-                </a:solidFill>
-                <a:latin typeface="Arial"/>
-              </a:rPr>
-              <a:t>molecule converge again, make sure ansible doesn’t report changes</a:t>
-            </a:r>
-            <a:endParaRPr b="0" lang="en-US" sz="2100" spc="-1" strike="noStrike">
-              <a:solidFill>
-                <a:srgbClr val="009bdd"/>
-              </a:solidFill>
-              <a:latin typeface="Arial"/>
-            </a:endParaRPr>
-          </a:p>
-          <a:p>
-            <a:pPr marL="432000" indent="-324000">
-              <a:spcBef>
-                <a:spcPts val="1060"/>
-              </a:spcBef>
-              <a:buClr>
-                <a:srgbClr val="77caee"/>
-              </a:buClr>
-              <a:buSzPct val="45000"/>
-              <a:buFont typeface="Wingdings" charset="2"/>
-              <a:buChar char=""/>
-            </a:pPr>
-            <a:r>
-              <a:rPr b="0" lang="en-US" sz="2400" spc="-1" strike="noStrike">
-                <a:solidFill>
-                  <a:srgbClr val="009bdd"/>
-                </a:solidFill>
-                <a:latin typeface="Arial"/>
-              </a:rPr>
-              <a:t>molecule destroy</a:t>
-            </a:r>
-            <a:endParaRPr b="0" lang="en-US" sz="2400" spc="-1" strike="noStrike">
-              <a:solidFill>
-                <a:srgbClr val="009bdd"/>
-              </a:solidFill>
-              <a:latin typeface="Arial"/>
-            </a:endParaRPr>
-          </a:p>
-          <a:p>
-            <a:pPr marL="432000" indent="-324000">
-              <a:spcBef>
-                <a:spcPts val="1060"/>
-              </a:spcBef>
-              <a:buClr>
-                <a:srgbClr val="77caee"/>
-              </a:buClr>
-              <a:buSzPct val="45000"/>
-              <a:buFont typeface="Wingdings" charset="2"/>
-              <a:buChar char=""/>
-            </a:pPr>
-            <a:r>
-              <a:rPr b="0" lang="en-US" sz="2400" spc="-1" strike="noStrike">
-                <a:solidFill>
-                  <a:srgbClr val="009bdd"/>
-                </a:solidFill>
-                <a:latin typeface="Arial"/>
-              </a:rPr>
-              <a:t>Integrate with CI/CD</a:t>
-            </a:r>
-            <a:endParaRPr b="0" lang="en-US" sz="2400" spc="-1" strike="noStrike">
               <a:solidFill>
                 <a:srgbClr val="009bdd"/>
               </a:solidFill>
@@ -5868,7 +5757,7 @@
                 </a:solidFill>
                 <a:latin typeface="Arial"/>
               </a:rPr>
-              <a:t>ansible-galaxy</a:t>
+              <a:t>Molecule</a:t>
             </a:r>
             <a:endParaRPr b="0" lang="en-US" sz="3300" spc="-1" strike="noStrike">
               <a:solidFill>
@@ -5921,7 +5810,7 @@
                 </a:solidFill>
                 <a:latin typeface="Arial"/>
               </a:rPr>
-              <a:t>ansible-galaxy role|collection search &lt;name&gt;</a:t>
+              <a:t>molecule init role user.example -d docker</a:t>
             </a:r>
             <a:endParaRPr b="0" lang="en-US" sz="2400" spc="-1" strike="noStrike">
               <a:solidFill>
@@ -5931,6 +5820,34 @@
             </a:endParaRPr>
           </a:p>
           <a:p>
+            <a:pPr lvl="1" marL="864000" indent="-324000">
+              <a:spcBef>
+                <a:spcPts val="850"/>
+              </a:spcBef>
+              <a:buClr>
+                <a:srgbClr val="77caee"/>
+              </a:buClr>
+              <a:buSzPct val="45000"/>
+              <a:buFont typeface="Wingdings" charset="2"/>
+              <a:buChar char=""/>
+            </a:pPr>
+            <a:r>
+              <a:rPr b="0" lang="en-US" sz="2100" spc="-1" strike="noStrike">
+                <a:solidFill>
+                  <a:srgbClr val="009bdd"/>
+                </a:solidFill>
+                <a:latin typeface="Arial"/>
+              </a:rPr>
+              <a:t>molecule init scenario -r &lt;current role&gt; -d docker</a:t>
+            </a:r>
+            <a:endParaRPr b="0" lang="en-US" sz="2100" spc="-1" strike="noStrike">
+              <a:solidFill>
+                <a:srgbClr val="009bdd"/>
+              </a:solidFill>
+              <a:latin typeface="Arial"/>
+            </a:endParaRPr>
+          </a:p>
+          <a:p>
             <a:pPr marL="432000" indent="-324000">
               <a:spcBef>
                 <a:spcPts val="1060"/>
@@ -5949,7 +5866,7 @@
                 </a:solidFill>
                 <a:latin typeface="Arial"/>
               </a:rPr>
-              <a:t>Roles in galaxy hub for many purposes</a:t>
+              <a:t>molecule converge</a:t>
             </a:r>
             <a:endParaRPr b="0" lang="en-US" sz="2400" spc="-1" strike="noStrike">
               <a:solidFill>
@@ -5959,6 +5876,34 @@
             </a:endParaRPr>
           </a:p>
           <a:p>
+            <a:pPr lvl="1" marL="864000" indent="-324000">
+              <a:spcBef>
+                <a:spcPts val="850"/>
+              </a:spcBef>
+              <a:buClr>
+                <a:srgbClr val="77caee"/>
+              </a:buClr>
+              <a:buSzPct val="45000"/>
+              <a:buFont typeface="Wingdings" charset="2"/>
+              <a:buChar char=""/>
+            </a:pPr>
+            <a:r>
+              <a:rPr b="0" lang="en-US" sz="2100" spc="-1" strike="noStrike">
+                <a:solidFill>
+                  <a:srgbClr val="009bdd"/>
+                </a:solidFill>
+                <a:latin typeface="Arial"/>
+              </a:rPr>
+              <a:t>Work on the role</a:t>
+            </a:r>
+            <a:endParaRPr b="0" lang="en-US" sz="2100" spc="-1" strike="noStrike">
+              <a:solidFill>
+                <a:srgbClr val="009bdd"/>
+              </a:solidFill>
+              <a:latin typeface="Arial"/>
+            </a:endParaRPr>
+          </a:p>
+          <a:p>
             <a:pPr marL="432000" indent="-324000">
               <a:spcBef>
                 <a:spcPts val="1060"/>
@@ -5970,6 +5915,99 @@
               <a:buFont typeface="Wingdings" charset="2"/>
               <a:buChar char=""/>
             </a:pPr>
+            <a:r>
+              <a:rPr b="0" lang="en-US" sz="2400" spc="-1" strike="noStrike">
+                <a:solidFill>
+                  <a:srgbClr val="009bdd"/>
+                </a:solidFill>
+                <a:latin typeface="Arial"/>
+              </a:rPr>
+              <a:t>molecule converge</a:t>
+            </a:r>
+            <a:endParaRPr b="0" lang="en-US" sz="2400" spc="-1" strike="noStrike">
+              <a:solidFill>
+                <a:srgbClr val="009bdd"/>
+              </a:solidFill>
+              <a:latin typeface="Arial"/>
+            </a:endParaRPr>
+          </a:p>
+          <a:p>
+            <a:pPr lvl="1" marL="864000" indent="-324000">
+              <a:spcBef>
+                <a:spcPts val="850"/>
+              </a:spcBef>
+              <a:buClr>
+                <a:srgbClr val="77caee"/>
+              </a:buClr>
+              <a:buSzPct val="45000"/>
+              <a:buFont typeface="Wingdings" charset="2"/>
+              <a:buChar char=""/>
+            </a:pPr>
+            <a:r>
+              <a:rPr b="0" lang="en-US" sz="2100" spc="-1" strike="noStrike">
+                <a:solidFill>
+                  <a:srgbClr val="009bdd"/>
+                </a:solidFill>
+                <a:latin typeface="Arial"/>
+              </a:rPr>
+              <a:t>molecule converge again, make sure ansible doesn’t report changes</a:t>
+            </a:r>
+            <a:endParaRPr b="0" lang="en-US" sz="2100" spc="-1" strike="noStrike">
+              <a:solidFill>
+                <a:srgbClr val="009bdd"/>
+              </a:solidFill>
+              <a:latin typeface="Arial"/>
+            </a:endParaRPr>
+          </a:p>
+          <a:p>
+            <a:pPr marL="432000" indent="-324000">
+              <a:spcBef>
+                <a:spcPts val="1060"/>
+              </a:spcBef>
+              <a:buClr>
+                <a:srgbClr val="77caee"/>
+              </a:buClr>
+              <a:buSzPct val="45000"/>
+              <a:buFont typeface="Wingdings" charset="2"/>
+              <a:buChar char=""/>
+            </a:pPr>
+            <a:r>
+              <a:rPr b="0" lang="en-US" sz="2400" spc="-1" strike="noStrike">
+                <a:solidFill>
+                  <a:srgbClr val="009bdd"/>
+                </a:solidFill>
+                <a:latin typeface="Arial"/>
+              </a:rPr>
+              <a:t>molecule destroy</a:t>
+            </a:r>
+            <a:endParaRPr b="0" lang="en-US" sz="2400" spc="-1" strike="noStrike">
+              <a:solidFill>
+                <a:srgbClr val="009bdd"/>
+              </a:solidFill>
+              <a:latin typeface="Arial"/>
+            </a:endParaRPr>
+          </a:p>
+          <a:p>
+            <a:pPr marL="432000" indent="-324000">
+              <a:spcBef>
+                <a:spcPts val="1060"/>
+              </a:spcBef>
+              <a:buClr>
+                <a:srgbClr val="77caee"/>
+              </a:buClr>
+              <a:buSzPct val="45000"/>
+              <a:buFont typeface="Wingdings" charset="2"/>
+              <a:buChar char=""/>
+            </a:pPr>
+            <a:r>
+              <a:rPr b="0" lang="en-US" sz="2400" spc="-1" strike="noStrike">
+                <a:solidFill>
+                  <a:srgbClr val="009bdd"/>
+                </a:solidFill>
+                <a:latin typeface="Arial"/>
+              </a:rPr>
+              <a:t>Integrate with CI/CD</a:t>
+            </a:r>
             <a:endParaRPr b="0" lang="en-US" sz="2400" spc="-1" strike="noStrike">
               <a:solidFill>
                 <a:srgbClr val="009bdd"/>
@@ -6041,7 +6079,7 @@
                 </a:solidFill>
                 <a:latin typeface="Arial"/>
               </a:rPr>
-              <a:t>Ansible environment</a:t>
+              <a:t>ansible-galaxy</a:t>
             </a:r>
             <a:endParaRPr b="0" lang="en-US" sz="3300" spc="-1" strike="noStrike">
               <a:solidFill>
@@ -6094,7 +6132,7 @@
                 </a:solidFill>
                 <a:latin typeface="Arial"/>
               </a:rPr>
-              <a:t>Use virtualenv, requirements.txt, and pip</a:t>
+              <a:t>ansible-galaxy role|collection search &lt;name&gt;</a:t>
             </a:r>
             <a:endParaRPr b="0" lang="en-US" sz="2400" spc="-1" strike="noStrike">
               <a:solidFill>
@@ -6104,62 +6142,6 @@
             </a:endParaRPr>
           </a:p>
           <a:p>
-            <a:pPr lvl="1" marL="864000" indent="-324000">
-              <a:spcBef>
-                <a:spcPts val="850"/>
-              </a:spcBef>
-              <a:buClr>
-                <a:srgbClr val="77caee"/>
-              </a:buClr>
-              <a:buSzPct val="45000"/>
-              <a:buFont typeface="Wingdings" charset="2"/>
-              <a:buChar char=""/>
-            </a:pPr>
-            <a:r>
-              <a:rPr b="0" lang="en-US" sz="2100" spc="-1" strike="noStrike">
-                <a:solidFill>
-                  <a:srgbClr val="009bdd"/>
-                </a:solidFill>
-                <a:latin typeface="Arial"/>
-              </a:rPr>
-              <a:t>Keeps tree clean</a:t>
-            </a:r>
-            <a:endParaRPr b="0" lang="en-US" sz="2100" spc="-1" strike="noStrike">
-              <a:solidFill>
-                <a:srgbClr val="009bdd"/>
-              </a:solidFill>
-              <a:latin typeface="Arial"/>
-            </a:endParaRPr>
-          </a:p>
-          <a:p>
-            <a:pPr lvl="1" marL="864000" indent="-324000">
-              <a:spcBef>
-                <a:spcPts val="850"/>
-              </a:spcBef>
-              <a:buClr>
-                <a:srgbClr val="77caee"/>
-              </a:buClr>
-              <a:buSzPct val="45000"/>
-              <a:buFont typeface="Wingdings" charset="2"/>
-              <a:buChar char=""/>
-            </a:pPr>
-            <a:r>
-              <a:rPr b="0" lang="en-US" sz="2100" spc="-1" strike="noStrike">
-                <a:solidFill>
-                  <a:srgbClr val="009bdd"/>
-                </a:solidFill>
-                <a:latin typeface="Arial"/>
-              </a:rPr>
-              <a:t>Doesn’t pollute rest of system</a:t>
-            </a:r>
-            <a:endParaRPr b="0" lang="en-US" sz="2100" spc="-1" strike="noStrike">
-              <a:solidFill>
-                <a:srgbClr val="009bdd"/>
-              </a:solidFill>
-              <a:latin typeface="Arial"/>
-            </a:endParaRPr>
-          </a:p>
-          <a:p>
             <a:pPr marL="432000" indent="-324000">
               <a:spcBef>
                 <a:spcPts val="1060"/>
@@ -6178,8 +6160,27 @@
                 </a:solidFill>
                 <a:latin typeface="Arial"/>
               </a:rPr>
-              <a:t>Alternatively, docker container</a:t>
-            </a:r>
+              <a:t>Roles in galaxy hub for many purposes</a:t>
+            </a:r>
+            <a:endParaRPr b="0" lang="en-US" sz="2400" spc="-1" strike="noStrike">
+              <a:solidFill>
+                <a:srgbClr val="009bdd"/>
+              </a:solidFill>
+              <a:latin typeface="Arial"/>
+            </a:endParaRPr>
+          </a:p>
+          <a:p>
+            <a:pPr marL="432000" indent="-324000">
+              <a:spcBef>
+                <a:spcPts val="1060"/>
+              </a:spcBef>
+              <a:buClr>
+                <a:srgbClr val="77caee"/>
+              </a:buClr>
+              <a:buSzPct val="45000"/>
+              <a:buFont typeface="Wingdings" charset="2"/>
+              <a:buChar char=""/>
+            </a:pPr>
             <a:endParaRPr b="0" lang="en-US" sz="2400" spc="-1" strike="noStrike">
               <a:solidFill>
                 <a:srgbClr val="009bdd"/>
@@ -6251,7 +6252,7 @@
                 </a:solidFill>
                 <a:latin typeface="Arial"/>
               </a:rPr>
-              <a:t>Future</a:t>
+              <a:t>Ansible environment</a:t>
             </a:r>
             <a:endParaRPr b="0" lang="en-US" sz="3300" spc="-1" strike="noStrike">
               <a:solidFill>
@@ -6304,7 +6305,7 @@
                 </a:solidFill>
                 <a:latin typeface="Arial"/>
               </a:rPr>
-              <a:t>AWX / Ansible Tower</a:t>
+              <a:t>Use virtualenv, requirements.txt, and pip</a:t>
             </a:r>
             <a:endParaRPr b="0" lang="en-US" sz="2400" spc="-1" strike="noStrike">
               <a:solidFill>
@@ -6314,6 +6315,62 @@
             </a:endParaRPr>
           </a:p>
           <a:p>
+            <a:pPr lvl="1" marL="864000" indent="-324000">
+              <a:spcBef>
+                <a:spcPts val="850"/>
+              </a:spcBef>
+              <a:buClr>
+                <a:srgbClr val="77caee"/>
+              </a:buClr>
+              <a:buSzPct val="45000"/>
+              <a:buFont typeface="Wingdings" charset="2"/>
+              <a:buChar char=""/>
+            </a:pPr>
+            <a:r>
+              <a:rPr b="0" lang="en-US" sz="2100" spc="-1" strike="noStrike">
+                <a:solidFill>
+                  <a:srgbClr val="009bdd"/>
+                </a:solidFill>
+                <a:latin typeface="Arial"/>
+              </a:rPr>
+              <a:t>Keeps tree clean</a:t>
+            </a:r>
+            <a:endParaRPr b="0" lang="en-US" sz="2100" spc="-1" strike="noStrike">
+              <a:solidFill>
+                <a:srgbClr val="009bdd"/>
+              </a:solidFill>
+              <a:latin typeface="Arial"/>
+            </a:endParaRPr>
+          </a:p>
+          <a:p>
+            <a:pPr lvl="1" marL="864000" indent="-324000">
+              <a:spcBef>
+                <a:spcPts val="850"/>
+              </a:spcBef>
+              <a:buClr>
+                <a:srgbClr val="77caee"/>
+              </a:buClr>
+              <a:buSzPct val="45000"/>
+              <a:buFont typeface="Wingdings" charset="2"/>
+              <a:buChar char=""/>
+            </a:pPr>
+            <a:r>
+              <a:rPr b="0" lang="en-US" sz="2100" spc="-1" strike="noStrike">
+                <a:solidFill>
+                  <a:srgbClr val="009bdd"/>
+                </a:solidFill>
+                <a:latin typeface="Arial"/>
+              </a:rPr>
+              <a:t>Doesn’t pollute rest of system</a:t>
+            </a:r>
+            <a:endParaRPr b="0" lang="en-US" sz="2100" spc="-1" strike="noStrike">
+              <a:solidFill>
+                <a:srgbClr val="009bdd"/>
+              </a:solidFill>
+              <a:latin typeface="Arial"/>
+            </a:endParaRPr>
+          </a:p>
+          <a:p>
             <a:pPr marL="432000" indent="-324000">
               <a:spcBef>
                 <a:spcPts val="1060"/>
@@ -6332,84 +6389,9 @@
                 </a:solidFill>
                 <a:latin typeface="Arial"/>
               </a:rPr>
-              <a:t>CI/CD</a:t>
+              <a:t>Alternatively, docker container</a:t>
             </a:r>
             <a:endParaRPr b="0" lang="en-US" sz="2400" spc="-1" strike="noStrike">
-              <a:solidFill>
-                <a:srgbClr val="009bdd"/>
-              </a:solidFill>
-              <a:latin typeface="Arial"/>
-            </a:endParaRPr>
-          </a:p>
-          <a:p>
-            <a:pPr lvl="1" marL="864000" indent="-324000">
-              <a:spcBef>
-                <a:spcPts val="850"/>
-              </a:spcBef>
-              <a:buClr>
-                <a:srgbClr val="77caee"/>
-              </a:buClr>
-              <a:buSzPct val="45000"/>
-              <a:buFont typeface="Wingdings" charset="2"/>
-              <a:buChar char=""/>
-            </a:pPr>
-            <a:r>
-              <a:rPr b="0" lang="en-US" sz="2100" spc="-1" strike="noStrike">
-                <a:solidFill>
-                  <a:srgbClr val="009bdd"/>
-                </a:solidFill>
-                <a:latin typeface="Arial"/>
-              </a:rPr>
-              <a:t>Jenkins</a:t>
-            </a:r>
-            <a:endParaRPr b="0" lang="en-US" sz="2100" spc="-1" strike="noStrike">
-              <a:solidFill>
-                <a:srgbClr val="009bdd"/>
-              </a:solidFill>
-              <a:latin typeface="Arial"/>
-            </a:endParaRPr>
-          </a:p>
-          <a:p>
-            <a:pPr lvl="1" marL="864000" indent="-324000">
-              <a:spcBef>
-                <a:spcPts val="850"/>
-              </a:spcBef>
-              <a:buClr>
-                <a:srgbClr val="77caee"/>
-              </a:buClr>
-              <a:buSzPct val="45000"/>
-              <a:buFont typeface="Wingdings" charset="2"/>
-              <a:buChar char=""/>
-            </a:pPr>
-            <a:r>
-              <a:rPr b="0" lang="en-US" sz="2100" spc="-1" strike="noStrike">
-                <a:solidFill>
-                  <a:srgbClr val="009bdd"/>
-                </a:solidFill>
-                <a:latin typeface="Arial"/>
-              </a:rPr>
-              <a:t>github/gitlab</a:t>
-            </a:r>
-            <a:endParaRPr b="0" lang="en-US" sz="2100" spc="-1" strike="noStrike">
-              <a:solidFill>
-                <a:srgbClr val="009bdd"/>
-              </a:solidFill>
-              <a:latin typeface="Arial"/>
-            </a:endParaRPr>
-          </a:p>
-          <a:p>
-            <a:pPr marL="432000" indent="-324000">
-              <a:spcBef>
-                <a:spcPts val="1060"/>
-              </a:spcBef>
-              <a:buClr>
-                <a:srgbClr val="77caee"/>
-              </a:buClr>
-              <a:buSzPct val="45000"/>
-              <a:buFont typeface="Wingdings" charset="2"/>
-              <a:buChar char=""/>
-            </a:pPr>
-            <a:endParaRPr b="0" lang="en-US" sz="2100" spc="-1" strike="noStrike">
               <a:solidFill>
                 <a:srgbClr val="009bdd"/>
               </a:solidFill>
@@ -6688,6 +6670,235 @@
 </p:sld>
 </file>
 
+<file path=ppt/slides/slide20.xml><?xml version="1.0" encoding="utf-8"?>
+<p:sld xmlns:a="http://schemas.openxmlformats.org/drawingml/2006/main" xmlns:p="http://schemas.openxmlformats.org/presentationml/2006/main" xmlns:r="http://schemas.openxmlformats.org/officeDocument/2006/relationships" xmlns:p14="http://schemas.microsoft.com/office/powerpoint/2010/main" xmlns:p15="http://schemas.microsoft.com/office/powerpoint/2012/main" xmlns:mc="http://schemas.openxmlformats.org/markup-compatibility/2006">
+  <p:cSld>
+    <p:spTree>
+      <p:nvGrpSpPr>
+        <p:cNvPr id="1" name=""/>
+        <p:cNvGrpSpPr/>
+        <p:nvPr/>
+      </p:nvGrpSpPr>
+      <p:grpSpPr>
+        <a:xfrm>
+          <a:off x="0" y="0"/>
+          <a:ext cx="0" cy="0"/>
+          <a:chOff x="0" y="0"/>
+          <a:chExt cx="0" cy="0"/>
+        </a:xfrm>
+      </p:grpSpPr>
+      <p:sp>
+        <p:nvSpPr>
+          <p:cNvPr id="122" name=""/>
+          <p:cNvSpPr txBox="1"/>
+          <p:nvPr/>
+        </p:nvSpPr>
+        <p:spPr>
+          <a:xfrm>
+            <a:off x="360000" y="180000"/>
+            <a:ext cx="9360000" cy="478080"/>
+          </a:xfrm>
+          <a:prstGeom prst="rect">
+            <a:avLst/>
+          </a:prstGeom>
+          <a:noFill/>
+          <a:ln w="0">
+            <a:noFill/>
+          </a:ln>
+        </p:spPr>
+        <p:txBody>
+          <a:bodyPr lIns="0" rIns="0" tIns="0" bIns="0" anchor="ctr">
+            <a:noAutofit/>
+          </a:bodyPr>
+          <a:p>
+            <a:pPr algn="ctr"/>
+            <a:r>
+              <a:rPr b="0" lang="en-US" sz="3300" spc="-1" strike="noStrike">
+                <a:solidFill>
+                  <a:srgbClr val="ffffff"/>
+                </a:solidFill>
+                <a:latin typeface="Arial"/>
+              </a:rPr>
+              <a:t>Future</a:t>
+            </a:r>
+            <a:endParaRPr b="0" lang="en-US" sz="3300" spc="-1" strike="noStrike">
+              <a:solidFill>
+                <a:srgbClr val="ffffff"/>
+              </a:solidFill>
+              <a:latin typeface="Arial"/>
+            </a:endParaRPr>
+          </a:p>
+        </p:txBody>
+      </p:sp>
+      <p:sp>
+        <p:nvSpPr>
+          <p:cNvPr id="123" name=""/>
+          <p:cNvSpPr txBox="1"/>
+          <p:nvPr/>
+        </p:nvSpPr>
+        <p:spPr>
+          <a:xfrm>
+            <a:off x="360000" y="1080000"/>
+            <a:ext cx="9360000" cy="3600000"/>
+          </a:xfrm>
+          <a:prstGeom prst="rect">
+            <a:avLst/>
+          </a:prstGeom>
+          <a:noFill/>
+          <a:ln w="0">
+            <a:noFill/>
+          </a:ln>
+        </p:spPr>
+        <p:txBody>
+          <a:bodyPr lIns="0" rIns="0" tIns="0" bIns="0">
+            <a:noAutofit/>
+          </a:bodyPr>
+          <a:p>
+            <a:pPr marL="432000" indent="-324000">
+              <a:spcBef>
+                <a:spcPts val="1060"/>
+              </a:spcBef>
+              <a:buClr>
+                <a:srgbClr val="77caee"/>
+              </a:buClr>
+              <a:buSzPct val="45000"/>
+              <a:buFont typeface="Wingdings" charset="2"/>
+              <a:buChar char=""/>
+            </a:pPr>
+            <a:r>
+              <a:rPr b="0" lang="en-US" sz="2400" spc="-1" strike="noStrike">
+                <a:solidFill>
+                  <a:srgbClr val="009bdd"/>
+                </a:solidFill>
+                <a:latin typeface="Arial"/>
+              </a:rPr>
+              <a:t>AWX / Ansible Tower</a:t>
+            </a:r>
+            <a:endParaRPr b="0" lang="en-US" sz="2400" spc="-1" strike="noStrike">
+              <a:solidFill>
+                <a:srgbClr val="009bdd"/>
+              </a:solidFill>
+              <a:latin typeface="Arial"/>
+            </a:endParaRPr>
+          </a:p>
+          <a:p>
+            <a:pPr marL="432000" indent="-324000">
+              <a:spcBef>
+                <a:spcPts val="1060"/>
+              </a:spcBef>
+              <a:buClr>
+                <a:srgbClr val="77caee"/>
+              </a:buClr>
+              <a:buSzPct val="45000"/>
+              <a:buFont typeface="Wingdings" charset="2"/>
+              <a:buChar char=""/>
+            </a:pPr>
+            <a:r>
+              <a:rPr b="0" lang="en-US" sz="2400" spc="-1" strike="noStrike">
+                <a:solidFill>
+                  <a:srgbClr val="009bdd"/>
+                </a:solidFill>
+                <a:latin typeface="Arial"/>
+              </a:rPr>
+              <a:t>CI/CD</a:t>
+            </a:r>
+            <a:endParaRPr b="0" lang="en-US" sz="2400" spc="-1" strike="noStrike">
+              <a:solidFill>
+                <a:srgbClr val="009bdd"/>
+              </a:solidFill>
+              <a:latin typeface="Arial"/>
+            </a:endParaRPr>
+          </a:p>
+          <a:p>
+            <a:pPr lvl="1" marL="864000" indent="-324000">
+              <a:spcBef>
+                <a:spcPts val="850"/>
+              </a:spcBef>
+              <a:buClr>
+                <a:srgbClr val="77caee"/>
+              </a:buClr>
+              <a:buSzPct val="45000"/>
+              <a:buFont typeface="Wingdings" charset="2"/>
+              <a:buChar char=""/>
+            </a:pPr>
+            <a:r>
+              <a:rPr b="0" lang="en-US" sz="2100" spc="-1" strike="noStrike">
+                <a:solidFill>
+                  <a:srgbClr val="009bdd"/>
+                </a:solidFill>
+                <a:latin typeface="Arial"/>
+              </a:rPr>
+              <a:t>Jenkins</a:t>
+            </a:r>
+            <a:endParaRPr b="0" lang="en-US" sz="2100" spc="-1" strike="noStrike">
+              <a:solidFill>
+                <a:srgbClr val="009bdd"/>
+              </a:solidFill>
+              <a:latin typeface="Arial"/>
+            </a:endParaRPr>
+          </a:p>
+          <a:p>
+            <a:pPr lvl="1" marL="864000" indent="-324000">
+              <a:spcBef>
+                <a:spcPts val="850"/>
+              </a:spcBef>
+              <a:buClr>
+                <a:srgbClr val="77caee"/>
+              </a:buClr>
+              <a:buSzPct val="45000"/>
+              <a:buFont typeface="Wingdings" charset="2"/>
+              <a:buChar char=""/>
+            </a:pPr>
+            <a:r>
+              <a:rPr b="0" lang="en-US" sz="2100" spc="-1" strike="noStrike">
+                <a:solidFill>
+                  <a:srgbClr val="009bdd"/>
+                </a:solidFill>
+                <a:latin typeface="Arial"/>
+              </a:rPr>
+              <a:t>github/gitlab</a:t>
+            </a:r>
+            <a:endParaRPr b="0" lang="en-US" sz="2100" spc="-1" strike="noStrike">
+              <a:solidFill>
+                <a:srgbClr val="009bdd"/>
+              </a:solidFill>
+              <a:latin typeface="Arial"/>
+            </a:endParaRPr>
+          </a:p>
+          <a:p>
+            <a:pPr marL="432000" indent="-324000">
+              <a:spcBef>
+                <a:spcPts val="1060"/>
+              </a:spcBef>
+              <a:buClr>
+                <a:srgbClr val="77caee"/>
+              </a:buClr>
+              <a:buSzPct val="45000"/>
+              <a:buFont typeface="Wingdings" charset="2"/>
+              <a:buChar char=""/>
+            </a:pPr>
+            <a:endParaRPr b="0" lang="en-US" sz="2100" spc="-1" strike="noStrike">
+              <a:solidFill>
+                <a:srgbClr val="009bdd"/>
+              </a:solidFill>
+              <a:latin typeface="Arial"/>
+            </a:endParaRPr>
+          </a:p>
+        </p:txBody>
+      </p:sp>
+    </p:spTree>
+  </p:cSld>
+  <mc:AlternateContent>
+    <mc:Choice Requires="p14">
+      <p:transition spd="slow" p14:dur="2000"/>
+    </mc:Choice>
+    <mc:Fallback>
+      <p:transition spd="slow"/>
+    </mc:Fallback>
+  </mc:AlternateContent>
+</p:sld>
+</file>
+
 <file path=ppt/slides/slide3.xml><?xml version="1.0" encoding="utf-8"?>
 <p:sld xmlns:a="http://schemas.openxmlformats.org/drawingml/2006/main" xmlns:p="http://schemas.openxmlformats.org/presentationml/2006/main" xmlns:r="http://schemas.openxmlformats.org/officeDocument/2006/relationships" xmlns:p14="http://schemas.microsoft.com/office/powerpoint/2010/main" xmlns:p15="http://schemas.microsoft.com/office/powerpoint/2012/main" xmlns:mc="http://schemas.openxmlformats.org/markup-compatibility/2006">
   <p:cSld>
@@ -7233,6 +7444,118 @@
               <a:latin typeface="Arial"/>
             </a:endParaRPr>
           </a:p>
+          <a:p>
+            <a:pPr lvl="2" marL="1296000" indent="-288000">
+              <a:spcBef>
+                <a:spcPts val="635"/>
+              </a:spcBef>
+              <a:buClr>
+                <a:srgbClr val="77caee"/>
+              </a:buClr>
+              <a:buSzPct val="45000"/>
+              <a:buFont typeface="Wingdings" charset="2"/>
+              <a:buChar char=""/>
+            </a:pPr>
+            <a:r>
+              <a:rPr b="0" lang="en-US" sz="1800" spc="-1" strike="noStrike">
+                <a:solidFill>
+                  <a:srgbClr val="009bdd"/>
+                </a:solidFill>
+                <a:latin typeface="Arial"/>
+              </a:rPr>
+              <a:t>Group hosts into groups</a:t>
+            </a:r>
+            <a:endParaRPr b="0" lang="en-US" sz="1800" spc="-1" strike="noStrike">
+              <a:solidFill>
+                <a:srgbClr val="009bdd"/>
+              </a:solidFill>
+              <a:latin typeface="Arial"/>
+            </a:endParaRPr>
+          </a:p>
+          <a:p>
+            <a:pPr lvl="2" marL="1296000" indent="-288000">
+              <a:spcBef>
+                <a:spcPts val="635"/>
+              </a:spcBef>
+              <a:buClr>
+                <a:srgbClr val="77caee"/>
+              </a:buClr>
+              <a:buSzPct val="45000"/>
+              <a:buFont typeface="Wingdings" charset="2"/>
+              <a:buChar char=""/>
+            </a:pPr>
+            <a:r>
+              <a:rPr b="0" lang="en-US" sz="1800" spc="-1" strike="noStrike">
+                <a:solidFill>
+                  <a:srgbClr val="009bdd"/>
+                </a:solidFill>
+                <a:latin typeface="Arial"/>
+              </a:rPr>
+              <a:t>Reference groups in playbooks/task lists rather than hosts</a:t>
+            </a:r>
+            <a:endParaRPr b="0" lang="en-US" sz="1800" spc="-1" strike="noStrike">
+              <a:solidFill>
+                <a:srgbClr val="009bdd"/>
+              </a:solidFill>
+              <a:latin typeface="Arial"/>
+            </a:endParaRPr>
+          </a:p>
+          <a:p>
+            <a:pPr lvl="3" marL="1728000" indent="-216000">
+              <a:spcBef>
+                <a:spcPts val="422"/>
+              </a:spcBef>
+              <a:buClr>
+                <a:srgbClr val="77caee"/>
+              </a:buClr>
+              <a:buSzPct val="45000"/>
+              <a:buFont typeface="Wingdings" charset="2"/>
+              <a:buChar char=""/>
+            </a:pPr>
+            <a:r>
+              <a:rPr b="0" lang="en-US" sz="1500" spc="-1" strike="noStrike">
+                <a:solidFill>
+                  <a:srgbClr val="009bdd"/>
+                </a:solidFill>
+                <a:latin typeface="Arial"/>
+              </a:rPr>
+              <a:t>This allows you to easily replace hosts without having to alter playbooks</a:t>
+            </a:r>
+            <a:endParaRPr b="0" lang="en-US" sz="1500" spc="-1" strike="noStrike">
+              <a:solidFill>
+                <a:srgbClr val="009bdd"/>
+              </a:solidFill>
+              <a:latin typeface="Arial"/>
+            </a:endParaRPr>
+          </a:p>
+          <a:p>
+            <a:pPr lvl="2" marL="1296000" indent="-288000">
+              <a:spcBef>
+                <a:spcPts val="635"/>
+              </a:spcBef>
+              <a:buClr>
+                <a:srgbClr val="77caee"/>
+              </a:buClr>
+              <a:buSzPct val="45000"/>
+              <a:buFont typeface="Wingdings" charset="2"/>
+              <a:buChar char=""/>
+            </a:pPr>
+            <a:r>
+              <a:rPr b="0" lang="en-US" sz="1800" spc="-1" strike="noStrike">
+                <a:solidFill>
+                  <a:srgbClr val="009bdd"/>
+                </a:solidFill>
+                <a:latin typeface="Arial"/>
+              </a:rPr>
+              <a:t> </a:t>
+            </a:r>
+            <a:endParaRPr b="0" lang="en-US" sz="1800" spc="-1" strike="noStrike">
+              <a:solidFill>
+                <a:srgbClr val="009bdd"/>
+              </a:solidFill>
+              <a:latin typeface="Arial"/>
+            </a:endParaRPr>
+          </a:p>
         </p:txBody>
       </p:sp>
     </p:spTree>
@@ -7297,7 +7620,7 @@
                 </a:solidFill>
                 <a:latin typeface="Arial"/>
               </a:rPr>
-              <a:t>Writing Ansible</a:t>
+              <a:t>Inventory</a:t>
             </a:r>
             <a:endParaRPr b="0" lang="en-US" sz="3300" spc="-1" strike="noStrike">
               <a:solidFill>
@@ -7350,7 +7673,7 @@
                 </a:solidFill>
                 <a:latin typeface="Arial"/>
               </a:rPr>
-              <a:t>Structure</a:t>
+              <a:t>Static</a:t>
             </a:r>
             <a:endParaRPr b="0" lang="en-US" sz="2400" spc="-1" strike="noStrike">
               <a:solidFill>
@@ -7378,7 +7701,7 @@
                 </a:solidFill>
                 <a:latin typeface="Arial"/>
               </a:rPr>
-              <a:t>Playbook has multiple tasks and roles</a:t>
+              <a:t>Groups hosts into groups</a:t>
             </a:r>
             <a:endParaRPr b="0" lang="en-US" sz="2100" spc="-1" strike="noStrike">
               <a:solidFill>
@@ -7388,6 +7711,146 @@
             </a:endParaRPr>
           </a:p>
           <a:p>
+            <a:pPr lvl="2" marL="1296000" indent="-288000">
+              <a:spcBef>
+                <a:spcPts val="635"/>
+              </a:spcBef>
+              <a:buClr>
+                <a:srgbClr val="77caee"/>
+              </a:buClr>
+              <a:buSzPct val="45000"/>
+              <a:buFont typeface="Wingdings" charset="2"/>
+              <a:buChar char=""/>
+            </a:pPr>
+            <a:r>
+              <a:rPr b="0" lang="en-US" sz="1800" spc="-1" strike="noStrike">
+                <a:solidFill>
+                  <a:srgbClr val="009bdd"/>
+                </a:solidFill>
+                <a:latin typeface="Arial"/>
+              </a:rPr>
+              <a:t>Several different formats</a:t>
+            </a:r>
+            <a:endParaRPr b="0" lang="en-US" sz="1800" spc="-1" strike="noStrike">
+              <a:solidFill>
+                <a:srgbClr val="009bdd"/>
+              </a:solidFill>
+              <a:latin typeface="Arial"/>
+            </a:endParaRPr>
+          </a:p>
+          <a:p>
+            <a:pPr lvl="3" marL="1728000" indent="-216000">
+              <a:spcBef>
+                <a:spcPts val="422"/>
+              </a:spcBef>
+              <a:buClr>
+                <a:srgbClr val="77caee"/>
+              </a:buClr>
+              <a:buSzPct val="45000"/>
+              <a:buFont typeface="Wingdings" charset="2"/>
+              <a:buChar char=""/>
+            </a:pPr>
+            <a:r>
+              <a:rPr b="0" lang="en-US" sz="1500" spc="-1" strike="noStrike">
+                <a:solidFill>
+                  <a:srgbClr val="009bdd"/>
+                </a:solidFill>
+                <a:latin typeface="Arial"/>
+              </a:rPr>
+              <a:t>Ini</a:t>
+            </a:r>
+            <a:endParaRPr b="0" lang="en-US" sz="1500" spc="-1" strike="noStrike">
+              <a:solidFill>
+                <a:srgbClr val="009bdd"/>
+              </a:solidFill>
+              <a:latin typeface="Arial"/>
+            </a:endParaRPr>
+          </a:p>
+          <a:p>
+            <a:pPr lvl="3" marL="1728000" indent="-216000">
+              <a:spcBef>
+                <a:spcPts val="422"/>
+              </a:spcBef>
+              <a:buClr>
+                <a:srgbClr val="77caee"/>
+              </a:buClr>
+              <a:buSzPct val="45000"/>
+              <a:buFont typeface="Wingdings" charset="2"/>
+              <a:buChar char=""/>
+            </a:pPr>
+            <a:r>
+              <a:rPr b="0" lang="en-US" sz="1500" spc="-1" strike="noStrike">
+                <a:solidFill>
+                  <a:srgbClr val="009bdd"/>
+                </a:solidFill>
+                <a:latin typeface="Arial"/>
+              </a:rPr>
+              <a:t>Yaml</a:t>
+            </a:r>
+            <a:endParaRPr b="0" lang="en-US" sz="1500" spc="-1" strike="noStrike">
+              <a:solidFill>
+                <a:srgbClr val="009bdd"/>
+              </a:solidFill>
+              <a:latin typeface="Arial"/>
+            </a:endParaRPr>
+          </a:p>
+          <a:p>
+            <a:pPr lvl="3" marL="1728000" indent="-216000">
+              <a:spcBef>
+                <a:spcPts val="422"/>
+              </a:spcBef>
+              <a:buClr>
+                <a:srgbClr val="77caee"/>
+              </a:buClr>
+              <a:buSzPct val="45000"/>
+              <a:buFont typeface="Wingdings" charset="2"/>
+              <a:buChar char=""/>
+            </a:pPr>
+            <a:r>
+              <a:rPr b="0" lang="en-US" sz="1500" spc="-1" strike="noStrike">
+                <a:solidFill>
+                  <a:srgbClr val="009bdd"/>
+                </a:solidFill>
+                <a:latin typeface="Arial"/>
+              </a:rPr>
+              <a:t>Json</a:t>
+            </a:r>
+            <a:endParaRPr b="0" lang="en-US" sz="1500" spc="-1" strike="noStrike">
+              <a:solidFill>
+                <a:srgbClr val="009bdd"/>
+              </a:solidFill>
+              <a:latin typeface="Arial"/>
+            </a:endParaRPr>
+          </a:p>
+          <a:p>
+            <a:pPr marL="432000" indent="-324000">
+              <a:spcBef>
+                <a:spcPts val="1060"/>
+              </a:spcBef>
+              <a:buClr>
+                <a:srgbClr val="77caee"/>
+              </a:buClr>
+              <a:buSzPct val="45000"/>
+              <a:buFont typeface="Wingdings" charset="2"/>
+              <a:buChar char=""/>
+            </a:pPr>
+            <a:r>
+              <a:rPr b="0" lang="en-US" sz="2400" spc="-1" strike="noStrike">
+                <a:solidFill>
+                  <a:srgbClr val="009bdd"/>
+                </a:solidFill>
+                <a:latin typeface="Arial"/>
+              </a:rPr>
+              <a:t>Dynamic</a:t>
+            </a:r>
+            <a:endParaRPr b="0" lang="en-US" sz="2400" spc="-1" strike="noStrike">
+              <a:solidFill>
+                <a:srgbClr val="009bdd"/>
+              </a:solidFill>
+              <a:latin typeface="Arial"/>
+            </a:endParaRPr>
+          </a:p>
+          <a:p>
             <a:pPr lvl="1" marL="864000" indent="-324000">
               <a:spcBef>
                 <a:spcPts val="850"/>
@@ -7406,7 +7869,7 @@
                 </a:solidFill>
                 <a:latin typeface="Arial"/>
               </a:rPr>
-              <a:t>Modules configure specific things</a:t>
+              <a:t>Queries sources for hosts and groups</a:t>
             </a:r>
             <a:endParaRPr b="0" lang="en-US" sz="2100" spc="-1" strike="noStrike">
               <a:solidFill>
@@ -7434,7 +7897,7 @@
                 </a:solidFill>
                 <a:latin typeface="Arial"/>
               </a:rPr>
-              <a:t>http</a:t>
+              <a:t>Ec2</a:t>
             </a:r>
             <a:endParaRPr b="0" lang="en-US" sz="1800" spc="-1" strike="noStrike">
               <a:solidFill>
@@ -7462,7 +7925,7 @@
                 </a:solidFill>
                 <a:latin typeface="Arial"/>
               </a:rPr>
-              <a:t>cron</a:t>
+              <a:t>Nmap</a:t>
             </a:r>
             <a:endParaRPr b="0" lang="en-US" sz="1800" spc="-1" strike="noStrike">
               <a:solidFill>
@@ -7472,34 +7935,6 @@
             </a:endParaRPr>
           </a:p>
           <a:p>
-            <a:pPr lvl="1" marL="864000" indent="-324000">
-              <a:spcBef>
-                <a:spcPts val="850"/>
-              </a:spcBef>
-              <a:buClr>
-                <a:srgbClr val="77caee"/>
-              </a:buClr>
-              <a:buSzPct val="45000"/>
-              <a:buFont typeface="Wingdings" charset="2"/>
-              <a:buChar char=""/>
-            </a:pPr>
-            <a:r>
-              <a:rPr b="0" lang="en-US" sz="2100" spc="-1" strike="noStrike">
-                <a:solidFill>
-                  <a:srgbClr val="009bdd"/>
-                </a:solidFill>
-                <a:latin typeface="Arial"/>
-              </a:rPr>
-              <a:t>Variables</a:t>
-            </a:r>
-            <a:endParaRPr b="0" lang="en-US" sz="2100" spc="-1" strike="noStrike">
-              <a:solidFill>
-                <a:srgbClr val="009bdd"/>
-              </a:solidFill>
-              <a:latin typeface="Arial"/>
-            </a:endParaRPr>
-          </a:p>
-          <a:p>
             <a:pPr lvl="2" marL="1296000" indent="-288000">
               <a:spcBef>
                 <a:spcPts val="635"/>
@@ -7518,27 +7953,8 @@
                 </a:solidFill>
                 <a:latin typeface="Arial"/>
               </a:rPr>
-              <a:t>Effectively global</a:t>
-            </a:r>
-            <a:endParaRPr b="0" lang="en-US" sz="1800" spc="-1" strike="noStrike">
-              <a:solidFill>
-                <a:srgbClr val="009bdd"/>
-              </a:solidFill>
-              <a:latin typeface="Arial"/>
-            </a:endParaRPr>
-          </a:p>
-          <a:p>
-            <a:pPr lvl="2" marL="1296000" indent="-288000">
-              <a:spcBef>
-                <a:spcPts val="635"/>
-              </a:spcBef>
-              <a:buClr>
-                <a:srgbClr val="77caee"/>
-              </a:buClr>
-              <a:buSzPct val="45000"/>
-              <a:buFont typeface="Wingdings" charset="2"/>
-              <a:buChar char=""/>
-            </a:pPr>
+              <a:t>etc</a:t>
+            </a:r>
             <a:endParaRPr b="0" lang="en-US" sz="1800" spc="-1" strike="noStrike">
               <a:solidFill>
                 <a:srgbClr val="009bdd"/>
@@ -7663,7 +8079,7 @@
                 </a:solidFill>
                 <a:latin typeface="Arial"/>
               </a:rPr>
-              <a:t>Variable Precedence (mostly)</a:t>
+              <a:t>Structure</a:t>
             </a:r>
             <a:endParaRPr b="0" lang="en-US" sz="2400" spc="-1" strike="noStrike">
               <a:solidFill>
@@ -7691,7 +8107,7 @@
                 </a:solidFill>
                 <a:latin typeface="Arial"/>
               </a:rPr>
-              <a:t>Role defaults</a:t>
+              <a:t>Playbook has multiple tasks and roles</a:t>
             </a:r>
             <a:endParaRPr b="0" lang="en-US" sz="2100" spc="-1" strike="noStrike">
               <a:solidFill>
@@ -7719,7 +8135,7 @@
                 </a:solidFill>
                 <a:latin typeface="Arial"/>
               </a:rPr>
-              <a:t>inventory/group_varrs</a:t>
+              <a:t>Modules configure specific things</a:t>
             </a:r>
             <a:endParaRPr b="0" lang="en-US" sz="2100" spc="-1" strike="noStrike">
               <a:solidFill>
@@ -7729,6 +8145,62 @@
             </a:endParaRPr>
           </a:p>
           <a:p>
+            <a:pPr lvl="2" marL="1296000" indent="-288000">
+              <a:spcBef>
+                <a:spcPts val="635"/>
+              </a:spcBef>
+              <a:buClr>
+                <a:srgbClr val="77caee"/>
+              </a:buClr>
+              <a:buSzPct val="45000"/>
+              <a:buFont typeface="Wingdings" charset="2"/>
+              <a:buChar char=""/>
+            </a:pPr>
+            <a:r>
+              <a:rPr b="0" lang="en-US" sz="1800" spc="-1" strike="noStrike">
+                <a:solidFill>
+                  <a:srgbClr val="009bdd"/>
+                </a:solidFill>
+                <a:latin typeface="Arial"/>
+              </a:rPr>
+              <a:t>http</a:t>
+            </a:r>
+            <a:endParaRPr b="0" lang="en-US" sz="1800" spc="-1" strike="noStrike">
+              <a:solidFill>
+                <a:srgbClr val="009bdd"/>
+              </a:solidFill>
+              <a:latin typeface="Arial"/>
+            </a:endParaRPr>
+          </a:p>
+          <a:p>
+            <a:pPr lvl="2" marL="1296000" indent="-288000">
+              <a:spcBef>
+                <a:spcPts val="635"/>
+              </a:spcBef>
+              <a:buClr>
+                <a:srgbClr val="77caee"/>
+              </a:buClr>
+              <a:buSzPct val="45000"/>
+              <a:buFont typeface="Wingdings" charset="2"/>
+              <a:buChar char=""/>
+            </a:pPr>
+            <a:r>
+              <a:rPr b="0" lang="en-US" sz="1800" spc="-1" strike="noStrike">
+                <a:solidFill>
+                  <a:srgbClr val="009bdd"/>
+                </a:solidFill>
+                <a:latin typeface="Arial"/>
+              </a:rPr>
+              <a:t>cron</a:t>
+            </a:r>
+            <a:endParaRPr b="0" lang="en-US" sz="1800" spc="-1" strike="noStrike">
+              <a:solidFill>
+                <a:srgbClr val="009bdd"/>
+              </a:solidFill>
+              <a:latin typeface="Arial"/>
+            </a:endParaRPr>
+          </a:p>
+          <a:p>
             <a:pPr lvl="1" marL="864000" indent="-324000">
               <a:spcBef>
                 <a:spcPts val="850"/>
@@ -7747,7 +8219,7 @@
                 </a:solidFill>
                 <a:latin typeface="Arial"/>
               </a:rPr>
-              <a:t>inventory/host_vars</a:t>
+              <a:t>Variables</a:t>
             </a:r>
             <a:endParaRPr b="0" lang="en-US" sz="2100" spc="-1" strike="noStrike">
               <a:solidFill>
@@ -7757,139 +8229,46 @@
             </a:endParaRPr>
           </a:p>
           <a:p>
-            <a:pPr lvl="1" marL="864000" indent="-324000">
-              <a:spcBef>
-                <a:spcPts val="850"/>
-              </a:spcBef>
-              <a:buClr>
-                <a:srgbClr val="77caee"/>
-              </a:buClr>
-              <a:buSzPct val="45000"/>
-              <a:buFont typeface="Wingdings" charset="2"/>
-              <a:buChar char=""/>
-            </a:pPr>
-            <a:r>
-              <a:rPr b="0" lang="en-US" sz="2100" spc="-1" strike="noStrike">
-                <a:solidFill>
-                  <a:srgbClr val="009bdd"/>
-                </a:solidFill>
-                <a:latin typeface="Arial"/>
-              </a:rPr>
-              <a:t>Host facts</a:t>
-            </a:r>
-            <a:endParaRPr b="0" lang="en-US" sz="2100" spc="-1" strike="noStrike">
-              <a:solidFill>
-                <a:srgbClr val="009bdd"/>
-              </a:solidFill>
-              <a:latin typeface="Arial"/>
-            </a:endParaRPr>
-          </a:p>
-          <a:p>
-            <a:pPr lvl="1" marL="864000" indent="-324000">
-              <a:spcBef>
-                <a:spcPts val="850"/>
-              </a:spcBef>
-              <a:buClr>
-                <a:srgbClr val="77caee"/>
-              </a:buClr>
-              <a:buSzPct val="45000"/>
-              <a:buFont typeface="Wingdings" charset="2"/>
-              <a:buChar char=""/>
-            </a:pPr>
-            <a:r>
-              <a:rPr b="0" lang="en-US" sz="2100" spc="-1" strike="noStrike">
-                <a:solidFill>
-                  <a:srgbClr val="009bdd"/>
-                </a:solidFill>
-                <a:latin typeface="Arial"/>
-              </a:rPr>
-              <a:t>Play vars</a:t>
-            </a:r>
-            <a:endParaRPr b="0" lang="en-US" sz="2100" spc="-1" strike="noStrike">
-              <a:solidFill>
-                <a:srgbClr val="009bdd"/>
-              </a:solidFill>
-              <a:latin typeface="Arial"/>
-            </a:endParaRPr>
-          </a:p>
-          <a:p>
-            <a:pPr lvl="1" marL="864000" indent="-324000">
-              <a:spcBef>
-                <a:spcPts val="850"/>
-              </a:spcBef>
-              <a:buClr>
-                <a:srgbClr val="77caee"/>
-              </a:buClr>
-              <a:buSzPct val="45000"/>
-              <a:buFont typeface="Wingdings" charset="2"/>
-              <a:buChar char=""/>
-            </a:pPr>
-            <a:r>
-              <a:rPr b="0" lang="en-US" sz="2100" spc="-1" strike="noStrike">
-                <a:solidFill>
-                  <a:srgbClr val="009bdd"/>
-                </a:solidFill>
-                <a:latin typeface="Arial"/>
-              </a:rPr>
-              <a:t>Role vars</a:t>
-            </a:r>
-            <a:endParaRPr b="0" lang="en-US" sz="2100" spc="-1" strike="noStrike">
-              <a:solidFill>
-                <a:srgbClr val="009bdd"/>
-              </a:solidFill>
-              <a:latin typeface="Arial"/>
-            </a:endParaRPr>
-          </a:p>
-          <a:p>
-            <a:pPr lvl="1" marL="864000" indent="-324000">
-              <a:spcBef>
-                <a:spcPts val="850"/>
-              </a:spcBef>
-              <a:buClr>
-                <a:srgbClr val="77caee"/>
-              </a:buClr>
-              <a:buSzPct val="45000"/>
-              <a:buFont typeface="Wingdings" charset="2"/>
-              <a:buChar char=""/>
-            </a:pPr>
-            <a:r>
-              <a:rPr b="0" lang="en-US" sz="2100" spc="-1" strike="noStrike">
-                <a:solidFill>
-                  <a:srgbClr val="009bdd"/>
-                </a:solidFill>
-                <a:latin typeface="Arial"/>
-              </a:rPr>
-              <a:t>set_facts</a:t>
-            </a:r>
-            <a:endParaRPr b="0" lang="en-US" sz="2100" spc="-1" strike="noStrike">
-              <a:solidFill>
-                <a:srgbClr val="009bdd"/>
-              </a:solidFill>
-              <a:latin typeface="Arial"/>
-            </a:endParaRPr>
-          </a:p>
-          <a:p>
-            <a:pPr lvl="1" marL="864000" indent="-324000">
-              <a:spcBef>
-                <a:spcPts val="850"/>
-              </a:spcBef>
-              <a:buClr>
-                <a:srgbClr val="77caee"/>
-              </a:buClr>
-              <a:buSzPct val="45000"/>
-              <a:buFont typeface="Wingdings" charset="2"/>
-              <a:buChar char=""/>
-            </a:pPr>
-            <a:r>
-              <a:rPr b="0" lang="en-US" sz="2100" spc="-1" strike="noStrike">
-                <a:solidFill>
-                  <a:srgbClr val="009bdd"/>
-                </a:solidFill>
-                <a:latin typeface="Arial"/>
-              </a:rPr>
-              <a:t>Extra vars</a:t>
-            </a:r>
-            <a:endParaRPr b="0" lang="en-US" sz="2100" spc="-1" strike="noStrike">
+            <a:pPr lvl="2" marL="1296000" indent="-288000">
+              <a:spcBef>
+                <a:spcPts val="635"/>
+              </a:spcBef>
+              <a:buClr>
+                <a:srgbClr val="77caee"/>
+              </a:buClr>
+              <a:buSzPct val="45000"/>
+              <a:buFont typeface="Wingdings" charset="2"/>
+              <a:buChar char=""/>
+            </a:pPr>
+            <a:r>
+              <a:rPr b="0" lang="en-US" sz="1800" spc="-1" strike="noStrike">
+                <a:solidFill>
+                  <a:srgbClr val="009bdd"/>
+                </a:solidFill>
+                <a:latin typeface="Arial"/>
+              </a:rPr>
+              <a:t>Effectively global</a:t>
+            </a:r>
+            <a:endParaRPr b="0" lang="en-US" sz="1800" spc="-1" strike="noStrike">
+              <a:solidFill>
+                <a:srgbClr val="009bdd"/>
+              </a:solidFill>
+              <a:latin typeface="Arial"/>
+            </a:endParaRPr>
+          </a:p>
+          <a:p>
+            <a:pPr lvl="2" marL="1296000" indent="-288000">
+              <a:spcBef>
+                <a:spcPts val="635"/>
+              </a:spcBef>
+              <a:buClr>
+                <a:srgbClr val="77caee"/>
+              </a:buClr>
+              <a:buSzPct val="45000"/>
+              <a:buFont typeface="Wingdings" charset="2"/>
+              <a:buChar char=""/>
+            </a:pPr>
+            <a:endParaRPr b="0" lang="en-US" sz="1800" spc="-1" strike="noStrike">
               <a:solidFill>
                 <a:srgbClr val="009bdd"/>
               </a:solidFill>
@@ -8013,7 +8392,7 @@
                 </a:solidFill>
                 <a:latin typeface="Arial"/>
               </a:rPr>
-              <a:t>There are actually 22 levels of variable precendence</a:t>
+              <a:t>Variable Precedence (mostly)</a:t>
             </a:r>
             <a:endParaRPr b="0" lang="en-US" sz="2400" spc="-1" strike="noStrike">
               <a:solidFill>
@@ -8041,7 +8420,7 @@
                 </a:solidFill>
                 <a:latin typeface="Arial"/>
               </a:rPr>
-              <a:t>Obviously complicated</a:t>
+              <a:t>Role defaults</a:t>
             </a:r>
             <a:endParaRPr b="0" lang="en-US" sz="2100" spc="-1" strike="noStrike">
               <a:solidFill>
@@ -8051,34 +8430,6 @@
             </a:endParaRPr>
           </a:p>
           <a:p>
-            <a:pPr marL="432000" indent="-324000">
-              <a:spcBef>
-                <a:spcPts val="1060"/>
-              </a:spcBef>
-              <a:buClr>
-                <a:srgbClr val="77caee"/>
-              </a:buClr>
-              <a:buSzPct val="45000"/>
-              <a:buFont typeface="Wingdings" charset="2"/>
-              <a:buChar char=""/>
-            </a:pPr>
-            <a:r>
-              <a:rPr b="0" lang="en-US" sz="2400" spc="-1" strike="noStrike">
-                <a:solidFill>
-                  <a:srgbClr val="009bdd"/>
-                </a:solidFill>
-                <a:latin typeface="Arial"/>
-              </a:rPr>
-              <a:t>Role order matters</a:t>
-            </a:r>
-            <a:endParaRPr b="0" lang="en-US" sz="2400" spc="-1" strike="noStrike">
-              <a:solidFill>
-                <a:srgbClr val="009bdd"/>
-              </a:solidFill>
-              <a:latin typeface="Arial"/>
-            </a:endParaRPr>
-          </a:p>
-          <a:p>
             <a:pPr lvl="1" marL="864000" indent="-324000">
               <a:spcBef>
                 <a:spcPts val="850"/>
@@ -8097,7 +8448,7 @@
                 </a:solidFill>
                 <a:latin typeface="Arial"/>
               </a:rPr>
-              <a:t>Later variables overwrite earlier ones</a:t>
+              <a:t>inventory/group_varrs</a:t>
             </a:r>
             <a:endParaRPr b="0" lang="en-US" sz="2100" spc="-1" strike="noStrike">
               <a:solidFill>
@@ -8107,27 +8458,167 @@
             </a:endParaRPr>
           </a:p>
           <a:p>
-            <a:pPr marL="432000" indent="-324000">
-              <a:spcBef>
-                <a:spcPts val="1060"/>
-              </a:spcBef>
-              <a:buClr>
-                <a:srgbClr val="77caee"/>
-              </a:buClr>
-              <a:buSzPct val="45000"/>
-              <a:buFont typeface="Wingdings" charset="2"/>
-              <a:buChar char=""/>
-            </a:pPr>
-            <a:r>
-              <a:rPr b="0" lang="en-US" sz="1300" spc="-1" strike="noStrike">
-                <a:solidFill>
-                  <a:srgbClr val="009bdd"/>
-                </a:solidFill>
-                <a:latin typeface="Arial"/>
-              </a:rPr>
-              <a:t>https://docs.ansible.com/ansible/latest/user_guide/playbooks_variables.html#understanding-variable-precedence</a:t>
-            </a:r>
-            <a:endParaRPr b="0" lang="en-US" sz="1300" spc="-1" strike="noStrike">
+            <a:pPr lvl="1" marL="864000" indent="-324000">
+              <a:spcBef>
+                <a:spcPts val="850"/>
+              </a:spcBef>
+              <a:buClr>
+                <a:srgbClr val="77caee"/>
+              </a:buClr>
+              <a:buSzPct val="45000"/>
+              <a:buFont typeface="Wingdings" charset="2"/>
+              <a:buChar char=""/>
+            </a:pPr>
+            <a:r>
+              <a:rPr b="0" lang="en-US" sz="2100" spc="-1" strike="noStrike">
+                <a:solidFill>
+                  <a:srgbClr val="009bdd"/>
+                </a:solidFill>
+                <a:latin typeface="Arial"/>
+              </a:rPr>
+              <a:t>inventory/host_vars</a:t>
+            </a:r>
+            <a:endParaRPr b="0" lang="en-US" sz="2100" spc="-1" strike="noStrike">
+              <a:solidFill>
+                <a:srgbClr val="009bdd"/>
+              </a:solidFill>
+              <a:latin typeface="Arial"/>
+            </a:endParaRPr>
+          </a:p>
+          <a:p>
+            <a:pPr lvl="1" marL="864000" indent="-324000">
+              <a:spcBef>
+                <a:spcPts val="850"/>
+              </a:spcBef>
+              <a:buClr>
+                <a:srgbClr val="77caee"/>
+              </a:buClr>
+              <a:buSzPct val="45000"/>
+              <a:buFont typeface="Wingdings" charset="2"/>
+              <a:buChar char=""/>
+            </a:pPr>
+            <a:r>
+              <a:rPr b="0" lang="en-US" sz="2100" spc="-1" strike="noStrike">
+                <a:solidFill>
+                  <a:srgbClr val="009bdd"/>
+                </a:solidFill>
+                <a:latin typeface="Arial"/>
+              </a:rPr>
+              <a:t>Host facts</a:t>
+            </a:r>
+            <a:endParaRPr b="0" lang="en-US" sz="2100" spc="-1" strike="noStrike">
+              <a:solidFill>
+                <a:srgbClr val="009bdd"/>
+              </a:solidFill>
+              <a:latin typeface="Arial"/>
+            </a:endParaRPr>
+          </a:p>
+          <a:p>
+            <a:pPr lvl="1" marL="864000" indent="-324000">
+              <a:spcBef>
+                <a:spcPts val="850"/>
+              </a:spcBef>
+              <a:buClr>
+                <a:srgbClr val="77caee"/>
+              </a:buClr>
+              <a:buSzPct val="45000"/>
+              <a:buFont typeface="Wingdings" charset="2"/>
+              <a:buChar char=""/>
+            </a:pPr>
+            <a:r>
+              <a:rPr b="0" lang="en-US" sz="2100" spc="-1" strike="noStrike">
+                <a:solidFill>
+                  <a:srgbClr val="009bdd"/>
+                </a:solidFill>
+                <a:latin typeface="Arial"/>
+              </a:rPr>
+              <a:t>Play vars</a:t>
+            </a:r>
+            <a:endParaRPr b="0" lang="en-US" sz="2100" spc="-1" strike="noStrike">
+              <a:solidFill>
+                <a:srgbClr val="009bdd"/>
+              </a:solidFill>
+              <a:latin typeface="Arial"/>
+            </a:endParaRPr>
+          </a:p>
+          <a:p>
+            <a:pPr lvl="1" marL="864000" indent="-324000">
+              <a:spcBef>
+                <a:spcPts val="850"/>
+              </a:spcBef>
+              <a:buClr>
+                <a:srgbClr val="77caee"/>
+              </a:buClr>
+              <a:buSzPct val="45000"/>
+              <a:buFont typeface="Wingdings" charset="2"/>
+              <a:buChar char=""/>
+            </a:pPr>
+            <a:r>
+              <a:rPr b="0" lang="en-US" sz="2100" spc="-1" strike="noStrike">
+                <a:solidFill>
+                  <a:srgbClr val="009bdd"/>
+                </a:solidFill>
+                <a:latin typeface="Arial"/>
+              </a:rPr>
+              <a:t>Role vars</a:t>
+            </a:r>
+            <a:endParaRPr b="0" lang="en-US" sz="2100" spc="-1" strike="noStrike">
+              <a:solidFill>
+                <a:srgbClr val="009bdd"/>
+              </a:solidFill>
+              <a:latin typeface="Arial"/>
+            </a:endParaRPr>
+          </a:p>
+          <a:p>
+            <a:pPr lvl="1" marL="864000" indent="-324000">
+              <a:spcBef>
+                <a:spcPts val="850"/>
+              </a:spcBef>
+              <a:buClr>
+                <a:srgbClr val="77caee"/>
+              </a:buClr>
+              <a:buSzPct val="45000"/>
+              <a:buFont typeface="Wingdings" charset="2"/>
+              <a:buChar char=""/>
+            </a:pPr>
+            <a:r>
+              <a:rPr b="0" lang="en-US" sz="2100" spc="-1" strike="noStrike">
+                <a:solidFill>
+                  <a:srgbClr val="009bdd"/>
+                </a:solidFill>
+                <a:latin typeface="Arial"/>
+              </a:rPr>
+              <a:t>set_facts</a:t>
+            </a:r>
+            <a:endParaRPr b="0" lang="en-US" sz="2100" spc="-1" strike="noStrike">
+              <a:solidFill>
+                <a:srgbClr val="009bdd"/>
+              </a:solidFill>
+              <a:latin typeface="Arial"/>
+            </a:endParaRPr>
+          </a:p>
+          <a:p>
+            <a:pPr lvl="1" marL="864000" indent="-324000">
+              <a:spcBef>
+                <a:spcPts val="850"/>
+              </a:spcBef>
+              <a:buClr>
+                <a:srgbClr val="77caee"/>
+              </a:buClr>
+              <a:buSzPct val="45000"/>
+              <a:buFont typeface="Wingdings" charset="2"/>
+              <a:buChar char=""/>
+            </a:pPr>
+            <a:r>
+              <a:rPr b="0" lang="en-US" sz="2100" spc="-1" strike="noStrike">
+                <a:solidFill>
+                  <a:srgbClr val="009bdd"/>
+                </a:solidFill>
+                <a:latin typeface="Arial"/>
+              </a:rPr>
+              <a:t>Extra vars</a:t>
+            </a:r>
+            <a:endParaRPr b="0" lang="en-US" sz="2100" spc="-1" strike="noStrike">
               <a:solidFill>
                 <a:srgbClr val="009bdd"/>
               </a:solidFill>
@@ -8251,7 +8742,7 @@
                 </a:solidFill>
                 <a:latin typeface="Arial"/>
               </a:rPr>
-              <a:t>Role structure</a:t>
+              <a:t>There are actually 22 levels of variable precendence</a:t>
             </a:r>
             <a:endParaRPr b="0" lang="en-US" sz="2400" spc="-1" strike="noStrike">
               <a:solidFill>
@@ -8279,7 +8770,7 @@
                 </a:solidFill>
                 <a:latin typeface="Arial"/>
               </a:rPr>
-              <a:t>Role</a:t>
+              <a:t>Obviously complicated</a:t>
             </a:r>
             <a:endParaRPr b="0" lang="en-US" sz="2100" spc="-1" strike="noStrike">
               <a:solidFill>
@@ -8289,139 +8780,27 @@
             </a:endParaRPr>
           </a:p>
           <a:p>
-            <a:pPr lvl="2" marL="1296000" indent="-288000">
-              <a:spcBef>
-                <a:spcPts val="635"/>
-              </a:spcBef>
-              <a:buClr>
-                <a:srgbClr val="77caee"/>
-              </a:buClr>
-              <a:buSzPct val="45000"/>
-              <a:buFont typeface="Wingdings" charset="2"/>
-              <a:buChar char=""/>
-            </a:pPr>
-            <a:r>
-              <a:rPr b="0" lang="en-US" sz="1800" spc="-1" strike="noStrike">
-                <a:solidFill>
-                  <a:srgbClr val="009bdd"/>
-                </a:solidFill>
-                <a:latin typeface="Arial"/>
-              </a:rPr>
-              <a:t>defaults</a:t>
-            </a:r>
-            <a:endParaRPr b="0" lang="en-US" sz="1800" spc="-1" strike="noStrike">
-              <a:solidFill>
-                <a:srgbClr val="009bdd"/>
-              </a:solidFill>
-              <a:latin typeface="Arial"/>
-            </a:endParaRPr>
-          </a:p>
-          <a:p>
-            <a:pPr lvl="2" marL="1296000" indent="-288000">
-              <a:spcBef>
-                <a:spcPts val="635"/>
-              </a:spcBef>
-              <a:buClr>
-                <a:srgbClr val="77caee"/>
-              </a:buClr>
-              <a:buSzPct val="45000"/>
-              <a:buFont typeface="Wingdings" charset="2"/>
-              <a:buChar char=""/>
-            </a:pPr>
-            <a:r>
-              <a:rPr b="0" lang="en-US" sz="1800" spc="-1" strike="noStrike">
-                <a:solidFill>
-                  <a:srgbClr val="009bdd"/>
-                </a:solidFill>
-                <a:latin typeface="Arial"/>
-              </a:rPr>
-              <a:t>files</a:t>
-            </a:r>
-            <a:endParaRPr b="0" lang="en-US" sz="1800" spc="-1" strike="noStrike">
-              <a:solidFill>
-                <a:srgbClr val="009bdd"/>
-              </a:solidFill>
-              <a:latin typeface="Arial"/>
-            </a:endParaRPr>
-          </a:p>
-          <a:p>
-            <a:pPr lvl="2" marL="1296000" indent="-288000">
-              <a:spcBef>
-                <a:spcPts val="635"/>
-              </a:spcBef>
-              <a:buClr>
-                <a:srgbClr val="77caee"/>
-              </a:buClr>
-              <a:buSzPct val="45000"/>
-              <a:buFont typeface="Wingdings" charset="2"/>
-              <a:buChar char=""/>
-            </a:pPr>
-            <a:r>
-              <a:rPr b="0" lang="en-US" sz="1800" spc="-1" strike="noStrike">
-                <a:solidFill>
-                  <a:srgbClr val="009bdd"/>
-                </a:solidFill>
-                <a:latin typeface="Arial"/>
-              </a:rPr>
-              <a:t>tasks</a:t>
-            </a:r>
-            <a:endParaRPr b="0" lang="en-US" sz="1800" spc="-1" strike="noStrike">
-              <a:solidFill>
-                <a:srgbClr val="009bdd"/>
-              </a:solidFill>
-              <a:latin typeface="Arial"/>
-            </a:endParaRPr>
-          </a:p>
-          <a:p>
-            <a:pPr lvl="2" marL="1296000" indent="-288000">
-              <a:spcBef>
-                <a:spcPts val="635"/>
-              </a:spcBef>
-              <a:buClr>
-                <a:srgbClr val="77caee"/>
-              </a:buClr>
-              <a:buSzPct val="45000"/>
-              <a:buFont typeface="Wingdings" charset="2"/>
-              <a:buChar char=""/>
-            </a:pPr>
-            <a:r>
-              <a:rPr b="0" lang="en-US" sz="1800" spc="-1" strike="noStrike">
-                <a:solidFill>
-                  <a:srgbClr val="009bdd"/>
-                </a:solidFill>
-                <a:latin typeface="Arial"/>
-              </a:rPr>
-              <a:t>templates</a:t>
-            </a:r>
-            <a:endParaRPr b="0" lang="en-US" sz="1800" spc="-1" strike="noStrike">
-              <a:solidFill>
-                <a:srgbClr val="009bdd"/>
-              </a:solidFill>
-              <a:latin typeface="Arial"/>
-            </a:endParaRPr>
-          </a:p>
-          <a:p>
-            <a:pPr lvl="2" marL="1296000" indent="-288000">
-              <a:spcBef>
-                <a:spcPts val="635"/>
-              </a:spcBef>
-              <a:buClr>
-                <a:srgbClr val="77caee"/>
-              </a:buClr>
-              <a:buSzPct val="45000"/>
-              <a:buFont typeface="Wingdings" charset="2"/>
-              <a:buChar char=""/>
-            </a:pPr>
-            <a:r>
-              <a:rPr b="0" lang="en-US" sz="1800" spc="-1" strike="noStrike">
-                <a:solidFill>
-                  <a:srgbClr val="009bdd"/>
-                </a:solidFill>
-                <a:latin typeface="Arial"/>
-              </a:rPr>
-              <a:t>vars</a:t>
-            </a:r>
-            <a:endParaRPr b="0" lang="en-US" sz="1800" spc="-1" strike="noStrike">
+            <a:pPr marL="432000" indent="-324000">
+              <a:spcBef>
+                <a:spcPts val="1060"/>
+              </a:spcBef>
+              <a:buClr>
+                <a:srgbClr val="77caee"/>
+              </a:buClr>
+              <a:buSzPct val="45000"/>
+              <a:buFont typeface="Wingdings" charset="2"/>
+              <a:buChar char=""/>
+            </a:pPr>
+            <a:r>
+              <a:rPr b="0" lang="en-US" sz="2400" spc="-1" strike="noStrike">
+                <a:solidFill>
+                  <a:srgbClr val="009bdd"/>
+                </a:solidFill>
+                <a:latin typeface="Arial"/>
+              </a:rPr>
+              <a:t>Role order matters</a:t>
+            </a:r>
+            <a:endParaRPr b="0" lang="en-US" sz="2400" spc="-1" strike="noStrike">
               <a:solidFill>
                 <a:srgbClr val="009bdd"/>
               </a:solidFill>
@@ -8447,9 +8826,37 @@
                 </a:solidFill>
                 <a:latin typeface="Arial"/>
               </a:rPr>
-              <a:t>Those are just the major ones</a:t>
+              <a:t>Later variables overwrite earlier ones</a:t>
             </a:r>
             <a:endParaRPr b="0" lang="en-US" sz="2100" spc="-1" strike="noStrike">
+              <a:solidFill>
+                <a:srgbClr val="009bdd"/>
+              </a:solidFill>
+              <a:latin typeface="Arial"/>
+            </a:endParaRPr>
+          </a:p>
+          <a:p>
+            <a:pPr marL="432000" indent="-324000">
+              <a:spcBef>
+                <a:spcPts val="1060"/>
+              </a:spcBef>
+              <a:buClr>
+                <a:srgbClr val="77caee"/>
+              </a:buClr>
+              <a:buSzPct val="45000"/>
+              <a:buFont typeface="Wingdings" charset="2"/>
+              <a:buChar char=""/>
+            </a:pPr>
+            <a:r>
+              <a:rPr b="0" lang="en-US" sz="1300" spc="-1" strike="noStrike">
+                <a:solidFill>
+                  <a:srgbClr val="009bdd"/>
+                </a:solidFill>
+                <a:latin typeface="Arial"/>
+              </a:rPr>
+              <a:t>https://docs.ansible.com/ansible/latest/user_guide/playbooks_variables.html#understanding-variable-precedence</a:t>
+            </a:r>
+            <a:endParaRPr b="0" lang="en-US" sz="1300" spc="-1" strike="noStrike">
               <a:solidFill>
                 <a:srgbClr val="009bdd"/>
               </a:solidFill>
@@ -8520,7 +8927,7 @@
                 </a:solidFill>
                 <a:latin typeface="Arial"/>
               </a:rPr>
-              <a:t>Role Structure</a:t>
+              <a:t>Writing Ansible</a:t>
             </a:r>
             <a:endParaRPr b="0" lang="en-US" sz="3300" spc="-1" strike="noStrike">
               <a:solidFill>
@@ -8573,7 +8980,7 @@
                 </a:solidFill>
                 <a:latin typeface="Arial"/>
               </a:rPr>
-              <a:t>Defaults</a:t>
+              <a:t>Role structure</a:t>
             </a:r>
             <a:endParaRPr b="0" lang="en-US" sz="2400" spc="-1" strike="noStrike">
               <a:solidFill>
@@ -8601,7 +9008,7 @@
                 </a:solidFill>
                 <a:latin typeface="Arial"/>
               </a:rPr>
-              <a:t>Contains default values for variables</a:t>
+              <a:t>Role</a:t>
             </a:r>
             <a:endParaRPr b="0" lang="en-US" sz="2100" spc="-1" strike="noStrike">
               <a:solidFill>
@@ -8611,6 +9018,146 @@
             </a:endParaRPr>
           </a:p>
           <a:p>
+            <a:pPr lvl="2" marL="1296000" indent="-288000">
+              <a:spcBef>
+                <a:spcPts val="635"/>
+              </a:spcBef>
+              <a:buClr>
+                <a:srgbClr val="77caee"/>
+              </a:buClr>
+              <a:buSzPct val="45000"/>
+              <a:buFont typeface="Wingdings" charset="2"/>
+              <a:buChar char=""/>
+            </a:pPr>
+            <a:r>
+              <a:rPr b="0" lang="en-US" sz="1800" spc="-1" strike="noStrike">
+                <a:solidFill>
+                  <a:srgbClr val="009bdd"/>
+                </a:solidFill>
+                <a:latin typeface="Arial"/>
+              </a:rPr>
+              <a:t>defaults</a:t>
+            </a:r>
+            <a:endParaRPr b="0" lang="en-US" sz="1800" spc="-1" strike="noStrike">
+              <a:solidFill>
+                <a:srgbClr val="009bdd"/>
+              </a:solidFill>
+              <a:latin typeface="Arial"/>
+            </a:endParaRPr>
+          </a:p>
+          <a:p>
+            <a:pPr lvl="2" marL="1296000" indent="-288000">
+              <a:spcBef>
+                <a:spcPts val="635"/>
+              </a:spcBef>
+              <a:buClr>
+                <a:srgbClr val="77caee"/>
+              </a:buClr>
+              <a:buSzPct val="45000"/>
+              <a:buFont typeface="Wingdings" charset="2"/>
+              <a:buChar char=""/>
+            </a:pPr>
+            <a:r>
+              <a:rPr b="0" lang="en-US" sz="1800" spc="-1" strike="noStrike">
+                <a:solidFill>
+                  <a:srgbClr val="009bdd"/>
+                </a:solidFill>
+                <a:latin typeface="Arial"/>
+              </a:rPr>
+              <a:t>files</a:t>
+            </a:r>
+            <a:endParaRPr b="0" lang="en-US" sz="1800" spc="-1" strike="noStrike">
+              <a:solidFill>
+                <a:srgbClr val="009bdd"/>
+              </a:solidFill>
+              <a:latin typeface="Arial"/>
+            </a:endParaRPr>
+          </a:p>
+          <a:p>
+            <a:pPr lvl="2" marL="1296000" indent="-288000">
+              <a:spcBef>
+                <a:spcPts val="635"/>
+              </a:spcBef>
+              <a:buClr>
+                <a:srgbClr val="77caee"/>
+              </a:buClr>
+              <a:buSzPct val="45000"/>
+              <a:buFont typeface="Wingdings" charset="2"/>
+              <a:buChar char=""/>
+            </a:pPr>
+            <a:r>
+              <a:rPr b="0" lang="en-US" sz="1800" spc="-1" strike="noStrike">
+                <a:solidFill>
+                  <a:srgbClr val="009bdd"/>
+                </a:solidFill>
+                <a:latin typeface="Arial"/>
+              </a:rPr>
+              <a:t>tasks</a:t>
+            </a:r>
+            <a:endParaRPr b="0" lang="en-US" sz="1800" spc="-1" strike="noStrike">
+              <a:solidFill>
+                <a:srgbClr val="009bdd"/>
+              </a:solidFill>
+              <a:latin typeface="Arial"/>
+            </a:endParaRPr>
+          </a:p>
+          <a:p>
+            <a:pPr lvl="2" marL="1296000" indent="-288000">
+              <a:spcBef>
+                <a:spcPts val="635"/>
+              </a:spcBef>
+              <a:buClr>
+                <a:srgbClr val="77caee"/>
+              </a:buClr>
+              <a:buSzPct val="45000"/>
+              <a:buFont typeface="Wingdings" charset="2"/>
+              <a:buChar char=""/>
+            </a:pPr>
+            <a:r>
+              <a:rPr b="0" lang="en-US" sz="1800" spc="-1" strike="noStrike">
+                <a:solidFill>
+                  <a:srgbClr val="009bdd"/>
+                </a:solidFill>
+                <a:latin typeface="Arial"/>
+              </a:rPr>
+              <a:t>templates</a:t>
+            </a:r>
+            <a:endParaRPr b="0" lang="en-US" sz="1800" spc="-1" strike="noStrike">
+              <a:solidFill>
+                <a:srgbClr val="009bdd"/>
+              </a:solidFill>
+              <a:latin typeface="Arial"/>
+            </a:endParaRPr>
+          </a:p>
+          <a:p>
+            <a:pPr lvl="2" marL="1296000" indent="-288000">
+              <a:spcBef>
+                <a:spcPts val="635"/>
+              </a:spcBef>
+              <a:buClr>
+                <a:srgbClr val="77caee"/>
+              </a:buClr>
+              <a:buSzPct val="45000"/>
+              <a:buFont typeface="Wingdings" charset="2"/>
+              <a:buChar char=""/>
+            </a:pPr>
+            <a:r>
+              <a:rPr b="0" lang="en-US" sz="1800" spc="-1" strike="noStrike">
+                <a:solidFill>
+                  <a:srgbClr val="009bdd"/>
+                </a:solidFill>
+                <a:latin typeface="Arial"/>
+              </a:rPr>
+              <a:t>vars</a:t>
+            </a:r>
+            <a:endParaRPr b="0" lang="en-US" sz="1800" spc="-1" strike="noStrike">
+              <a:solidFill>
+                <a:srgbClr val="009bdd"/>
+              </a:solidFill>
+              <a:latin typeface="Arial"/>
+            </a:endParaRPr>
+          </a:p>
+          <a:p>
             <a:pPr lvl="1" marL="864000" indent="-324000">
               <a:spcBef>
                 <a:spcPts val="850"/>
@@ -8629,35 +9176,7 @@
                 </a:solidFill>
                 <a:latin typeface="Arial"/>
               </a:rPr>
-              <a:t>Low precedence, so can be overridden</a:t>
-            </a:r>
-            <a:endParaRPr b="0" lang="en-US" sz="2100" spc="-1" strike="noStrike">
-              <a:solidFill>
-                <a:srgbClr val="009bdd"/>
-              </a:solidFill>
-              <a:latin typeface="Arial"/>
-            </a:endParaRPr>
-          </a:p>
-          <a:p>
-            <a:pPr lvl="1" marL="864000" indent="-324000">
-              <a:spcBef>
-                <a:spcPts val="850"/>
-              </a:spcBef>
-              <a:buClr>
-                <a:srgbClr val="77caee"/>
-              </a:buClr>
-              <a:buSzPct val="45000"/>
-              <a:buFont typeface="Wingdings" charset="2"/>
-              <a:buChar char=""/>
-            </a:pPr>
-            <a:r>
-              <a:rPr b="0" lang="en-US" sz="2100" spc="-1" strike="noStrike">
-                <a:solidFill>
-                  <a:srgbClr val="009bdd"/>
-                </a:solidFill>
-                <a:latin typeface="Arial"/>
-              </a:rPr>
-              <a:t>Use as document showing all inputs, with examples</a:t>
+              <a:t>Those are just the major ones</a:t>
             </a:r>
             <a:endParaRPr b="0" lang="en-US" sz="2100" spc="-1" strike="noStrike">
               <a:solidFill>

</xml_diff>